<commit_message>
-We now store "non-ex" domains in cache
</commit_message>
<xml_diff>
--- a/פלואו תוכנית.pptx
+++ b/פלואו תוכנית.pptx
@@ -6,6 +6,8 @@
   </p:sldMasterIdLst>
   <p:sldIdLst>
     <p:sldId id="256" r:id="rId2"/>
+    <p:sldId id="257" r:id="rId3"/>
+    <p:sldId id="258" r:id="rId4"/>
   </p:sldIdLst>
   <p:sldSz cx="12192000" cy="6858000"/>
   <p:notesSz cx="6858000" cy="9144000"/>
@@ -104,7 +106,1815 @@
       </a:defRPr>
     </a:lvl9pPr>
   </p:defaultTextStyle>
+  <p:extLst>
+    <p:ext uri="{EFAFB233-063F-42B5-8137-9DF3F51BA10A}">
+      <p15:sldGuideLst xmlns:p15="http://schemas.microsoft.com/office/powerpoint/2012/main"/>
+    </p:ext>
+  </p:extLst>
 </p:presentation>
+</file>
+
+<file path=ppt/revisionInfo.xml><?xml version="1.0" encoding="utf-8"?>
+<p1510:revInfo xmlns:a="http://schemas.openxmlformats.org/drawingml/2006/main" xmlns:r="http://schemas.openxmlformats.org/officeDocument/2006/relationships" xmlns:p1510="http://schemas.microsoft.com/office/powerpoint/2015/10/main">
+  <p1510:revLst>
+    <p1510:client id="{3D0969C5-1F15-4295-88FA-413B1D0F027D}" v="204" dt="2024-11-25T12:57:49.270"/>
+  </p1510:revLst>
+</p1510:revInfo>
+</file>
+
+<file path=ppt/changesInfos/changesInfo1.xml><?xml version="1.0" encoding="utf-8"?>
+<pc:chgInfo xmlns:a="http://schemas.openxmlformats.org/drawingml/2006/main" xmlns:r="http://schemas.openxmlformats.org/officeDocument/2006/relationships" xmlns:ac="http://schemas.microsoft.com/office/drawing/2013/main/command" xmlns:pc="http://schemas.microsoft.com/office/powerpoint/2013/main/command">
+  <pc:docChgLst>
+    <pc:chgData name="נועם ליבוביץ" userId="4c2341a7ea8aa887" providerId="LiveId" clId="{3D0969C5-1F15-4295-88FA-413B1D0F027D}"/>
+    <pc:docChg chg="undo custSel addSld modSld">
+      <pc:chgData name="נועם ליבוביץ" userId="4c2341a7ea8aa887" providerId="LiveId" clId="{3D0969C5-1F15-4295-88FA-413B1D0F027D}" dt="2024-11-25T12:57:59.714" v="482" actId="478"/>
+      <pc:docMkLst>
+        <pc:docMk/>
+      </pc:docMkLst>
+      <pc:sldChg chg="addSp modSp mod">
+        <pc:chgData name="נועם ליבוביץ" userId="4c2341a7ea8aa887" providerId="LiveId" clId="{3D0969C5-1F15-4295-88FA-413B1D0F027D}" dt="2024-11-25T12:33:30.815" v="48" actId="20577"/>
+        <pc:sldMkLst>
+          <pc:docMk/>
+          <pc:sldMk cId="309714252" sldId="256"/>
+        </pc:sldMkLst>
+        <pc:spChg chg="add mod">
+          <ac:chgData name="נועם ליבוביץ" userId="4c2341a7ea8aa887" providerId="LiveId" clId="{3D0969C5-1F15-4295-88FA-413B1D0F027D}" dt="2024-11-25T12:32:49.383" v="34" actId="1076"/>
+          <ac:spMkLst>
+            <pc:docMk/>
+            <pc:sldMk cId="309714252" sldId="256"/>
+            <ac:spMk id="2" creationId="{D34DC808-7425-641D-B465-D5CB92E92707}"/>
+          </ac:spMkLst>
+        </pc:spChg>
+        <pc:spChg chg="mod">
+          <ac:chgData name="נועם ליבוביץ" userId="4c2341a7ea8aa887" providerId="LiveId" clId="{3D0969C5-1F15-4295-88FA-413B1D0F027D}" dt="2024-11-25T12:33:30.815" v="48" actId="20577"/>
+          <ac:spMkLst>
+            <pc:docMk/>
+            <pc:sldMk cId="309714252" sldId="256"/>
+            <ac:spMk id="8" creationId="{77D6FE4D-DA01-9799-F79E-E6BEC236B3B1}"/>
+          </ac:spMkLst>
+        </pc:spChg>
+        <pc:cxnChg chg="add mod">
+          <ac:chgData name="נועם ליבוביץ" userId="4c2341a7ea8aa887" providerId="LiveId" clId="{3D0969C5-1F15-4295-88FA-413B1D0F027D}" dt="2024-11-25T12:32:49.383" v="34" actId="1076"/>
+          <ac:cxnSpMkLst>
+            <pc:docMk/>
+            <pc:sldMk cId="309714252" sldId="256"/>
+            <ac:cxnSpMk id="3" creationId="{0D533966-E6F2-5542-BEBD-F2556A28A671}"/>
+          </ac:cxnSpMkLst>
+        </pc:cxnChg>
+      </pc:sldChg>
+      <pc:sldChg chg="addSp delSp modSp new mod">
+        <pc:chgData name="נועם ליבוביץ" userId="4c2341a7ea8aa887" providerId="LiveId" clId="{3D0969C5-1F15-4295-88FA-413B1D0F027D}" dt="2024-11-25T12:37:11.050" v="113" actId="13822"/>
+        <pc:sldMkLst>
+          <pc:docMk/>
+          <pc:sldMk cId="546072099" sldId="257"/>
+        </pc:sldMkLst>
+        <pc:spChg chg="del">
+          <ac:chgData name="נועם ליבוביץ" userId="4c2341a7ea8aa887" providerId="LiveId" clId="{3D0969C5-1F15-4295-88FA-413B1D0F027D}" dt="2024-11-25T12:35:37.377" v="50" actId="478"/>
+          <ac:spMkLst>
+            <pc:docMk/>
+            <pc:sldMk cId="546072099" sldId="257"/>
+            <ac:spMk id="2" creationId="{7E8E86FA-C6A6-AC4F-6256-7B3D8CB4E0C6}"/>
+          </ac:spMkLst>
+        </pc:spChg>
+        <pc:spChg chg="del">
+          <ac:chgData name="נועם ליבוביץ" userId="4c2341a7ea8aa887" providerId="LiveId" clId="{3D0969C5-1F15-4295-88FA-413B1D0F027D}" dt="2024-11-25T12:35:37.377" v="50" actId="478"/>
+          <ac:spMkLst>
+            <pc:docMk/>
+            <pc:sldMk cId="546072099" sldId="257"/>
+            <ac:spMk id="3" creationId="{9B45AE72-F458-DD69-15B7-D90D4427A6D3}"/>
+          </ac:spMkLst>
+        </pc:spChg>
+        <pc:spChg chg="add mod">
+          <ac:chgData name="נועם ליבוביץ" userId="4c2341a7ea8aa887" providerId="LiveId" clId="{3D0969C5-1F15-4295-88FA-413B1D0F027D}" dt="2024-11-25T12:35:43.576" v="60" actId="1076"/>
+          <ac:spMkLst>
+            <pc:docMk/>
+            <pc:sldMk cId="546072099" sldId="257"/>
+            <ac:spMk id="4" creationId="{164E5F31-98C1-9C69-69F7-A0BB59A7A943}"/>
+          </ac:spMkLst>
+        </pc:spChg>
+        <pc:spChg chg="add mod">
+          <ac:chgData name="נועם ליבוביץ" userId="4c2341a7ea8aa887" providerId="LiveId" clId="{3D0969C5-1F15-4295-88FA-413B1D0F027D}" dt="2024-11-25T12:35:50.618" v="71" actId="13822"/>
+          <ac:spMkLst>
+            <pc:docMk/>
+            <pc:sldMk cId="546072099" sldId="257"/>
+            <ac:spMk id="5" creationId="{24ED442B-1DA6-B283-6695-D9AF02F7286C}"/>
+          </ac:spMkLst>
+        </pc:spChg>
+        <pc:spChg chg="add mod">
+          <ac:chgData name="נועם ליבוביץ" userId="4c2341a7ea8aa887" providerId="LiveId" clId="{3D0969C5-1F15-4295-88FA-413B1D0F027D}" dt="2024-11-25T12:36:04.446" v="84"/>
+          <ac:spMkLst>
+            <pc:docMk/>
+            <pc:sldMk cId="546072099" sldId="257"/>
+            <ac:spMk id="6" creationId="{10BAE424-709F-3FFF-983A-920B53EAA544}"/>
+          </ac:spMkLst>
+        </pc:spChg>
+        <pc:spChg chg="add mod">
+          <ac:chgData name="נועם ליבוביץ" userId="4c2341a7ea8aa887" providerId="LiveId" clId="{3D0969C5-1F15-4295-88FA-413B1D0F027D}" dt="2024-11-25T12:36:01.021" v="82" actId="20577"/>
+          <ac:spMkLst>
+            <pc:docMk/>
+            <pc:sldMk cId="546072099" sldId="257"/>
+            <ac:spMk id="7" creationId="{24AF0CB8-ED91-CB73-11ED-532B851DD8D6}"/>
+          </ac:spMkLst>
+        </pc:spChg>
+        <pc:spChg chg="add mod">
+          <ac:chgData name="נועם ליבוביץ" userId="4c2341a7ea8aa887" providerId="LiveId" clId="{3D0969C5-1F15-4295-88FA-413B1D0F027D}" dt="2024-11-25T12:36:03.398" v="83"/>
+          <ac:spMkLst>
+            <pc:docMk/>
+            <pc:sldMk cId="546072099" sldId="257"/>
+            <ac:spMk id="8" creationId="{621B158F-0369-19CD-0DCB-CD901A9116CF}"/>
+          </ac:spMkLst>
+        </pc:spChg>
+        <pc:picChg chg="add del mod">
+          <ac:chgData name="נועם ליבוביץ" userId="4c2341a7ea8aa887" providerId="LiveId" clId="{3D0969C5-1F15-4295-88FA-413B1D0F027D}" dt="2024-11-25T12:36:08.729" v="86" actId="34307"/>
+          <ac:picMkLst>
+            <pc:docMk/>
+            <pc:sldMk cId="546072099" sldId="257"/>
+            <ac:picMk id="9" creationId="{17884F6F-793C-44F2-B068-5948102076FF}"/>
+          </ac:picMkLst>
+        </pc:picChg>
+        <pc:cxnChg chg="add del mod">
+          <ac:chgData name="נועם ליבוביץ" userId="4c2341a7ea8aa887" providerId="LiveId" clId="{3D0969C5-1F15-4295-88FA-413B1D0F027D}" dt="2024-11-25T12:36:27.788" v="89" actId="478"/>
+          <ac:cxnSpMkLst>
+            <pc:docMk/>
+            <pc:sldMk cId="546072099" sldId="257"/>
+            <ac:cxnSpMk id="11" creationId="{9945BA0C-5781-4A20-1A90-273DB7CB330D}"/>
+          </ac:cxnSpMkLst>
+        </pc:cxnChg>
+        <pc:cxnChg chg="add mod">
+          <ac:chgData name="נועם ליבוביץ" userId="4c2341a7ea8aa887" providerId="LiveId" clId="{3D0969C5-1F15-4295-88FA-413B1D0F027D}" dt="2024-11-25T12:37:11.050" v="113" actId="13822"/>
+          <ac:cxnSpMkLst>
+            <pc:docMk/>
+            <pc:sldMk cId="546072099" sldId="257"/>
+            <ac:cxnSpMk id="13" creationId="{9E7BA48D-7063-DFF7-01FD-FD4BC7392F39}"/>
+          </ac:cxnSpMkLst>
+        </pc:cxnChg>
+        <pc:cxnChg chg="add mod">
+          <ac:chgData name="נועם ליבוביץ" userId="4c2341a7ea8aa887" providerId="LiveId" clId="{3D0969C5-1F15-4295-88FA-413B1D0F027D}" dt="2024-11-25T12:36:32.550" v="92" actId="14100"/>
+          <ac:cxnSpMkLst>
+            <pc:docMk/>
+            <pc:sldMk cId="546072099" sldId="257"/>
+            <ac:cxnSpMk id="14" creationId="{8ADE21A8-FE87-448E-BE3C-454AE7E7B8D7}"/>
+          </ac:cxnSpMkLst>
+        </pc:cxnChg>
+        <pc:cxnChg chg="add">
+          <ac:chgData name="נועם ליבוביץ" userId="4c2341a7ea8aa887" providerId="LiveId" clId="{3D0969C5-1F15-4295-88FA-413B1D0F027D}" dt="2024-11-25T12:36:40.056" v="93" actId="11529"/>
+          <ac:cxnSpMkLst>
+            <pc:docMk/>
+            <pc:sldMk cId="546072099" sldId="257"/>
+            <ac:cxnSpMk id="18" creationId="{5AC2F060-E5FC-E432-3023-3C2EDC0AB6AC}"/>
+          </ac:cxnSpMkLst>
+        </pc:cxnChg>
+        <pc:cxnChg chg="add mod">
+          <ac:chgData name="נועם ליבוביץ" userId="4c2341a7ea8aa887" providerId="LiveId" clId="{3D0969C5-1F15-4295-88FA-413B1D0F027D}" dt="2024-11-25T12:36:44.570" v="96" actId="14100"/>
+          <ac:cxnSpMkLst>
+            <pc:docMk/>
+            <pc:sldMk cId="546072099" sldId="257"/>
+            <ac:cxnSpMk id="19" creationId="{11B79FED-619B-09F8-2E46-B84D19B39396}"/>
+          </ac:cxnSpMkLst>
+        </pc:cxnChg>
+        <pc:cxnChg chg="add mod">
+          <ac:chgData name="נועם ליבוביץ" userId="4c2341a7ea8aa887" providerId="LiveId" clId="{3D0969C5-1F15-4295-88FA-413B1D0F027D}" dt="2024-11-25T12:36:52.452" v="100" actId="14100"/>
+          <ac:cxnSpMkLst>
+            <pc:docMk/>
+            <pc:sldMk cId="546072099" sldId="257"/>
+            <ac:cxnSpMk id="22" creationId="{054C4C0D-7B95-65FF-0E3D-F5AD780F49ED}"/>
+          </ac:cxnSpMkLst>
+        </pc:cxnChg>
+        <pc:cxnChg chg="add mod">
+          <ac:chgData name="נועם ליבוביץ" userId="4c2341a7ea8aa887" providerId="LiveId" clId="{3D0969C5-1F15-4295-88FA-413B1D0F027D}" dt="2024-11-25T12:36:57.359" v="103" actId="14100"/>
+          <ac:cxnSpMkLst>
+            <pc:docMk/>
+            <pc:sldMk cId="546072099" sldId="257"/>
+            <ac:cxnSpMk id="25" creationId="{2C4025E6-5058-C305-08B1-3576DB444E4E}"/>
+          </ac:cxnSpMkLst>
+        </pc:cxnChg>
+        <pc:cxnChg chg="add mod">
+          <ac:chgData name="נועם ליבוביץ" userId="4c2341a7ea8aa887" providerId="LiveId" clId="{3D0969C5-1F15-4295-88FA-413B1D0F027D}" dt="2024-11-25T12:37:04.358" v="108" actId="14100"/>
+          <ac:cxnSpMkLst>
+            <pc:docMk/>
+            <pc:sldMk cId="546072099" sldId="257"/>
+            <ac:cxnSpMk id="28" creationId="{A8FF76D7-A2DD-3532-BB78-7B85A52AADC6}"/>
+          </ac:cxnSpMkLst>
+        </pc:cxnChg>
+        <pc:cxnChg chg="add mod">
+          <ac:chgData name="נועם ליבוביץ" userId="4c2341a7ea8aa887" providerId="LiveId" clId="{3D0969C5-1F15-4295-88FA-413B1D0F027D}" dt="2024-11-25T12:37:09.068" v="112" actId="13822"/>
+          <ac:cxnSpMkLst>
+            <pc:docMk/>
+            <pc:sldMk cId="546072099" sldId="257"/>
+            <ac:cxnSpMk id="31" creationId="{8C206C99-3726-E16D-6DC7-FC6187B1A5DF}"/>
+          </ac:cxnSpMkLst>
+        </pc:cxnChg>
+      </pc:sldChg>
+      <pc:sldChg chg="addSp delSp modSp new mod">
+        <pc:chgData name="נועם ליבוביץ" userId="4c2341a7ea8aa887" providerId="LiveId" clId="{3D0969C5-1F15-4295-88FA-413B1D0F027D}" dt="2024-11-25T12:57:59.714" v="482" actId="478"/>
+        <pc:sldMkLst>
+          <pc:docMk/>
+          <pc:sldMk cId="3331921883" sldId="258"/>
+        </pc:sldMkLst>
+        <pc:spChg chg="del">
+          <ac:chgData name="נועם ליבוביץ" userId="4c2341a7ea8aa887" providerId="LiveId" clId="{3D0969C5-1F15-4295-88FA-413B1D0F027D}" dt="2024-11-25T12:49:20.252" v="115" actId="478"/>
+          <ac:spMkLst>
+            <pc:docMk/>
+            <pc:sldMk cId="3331921883" sldId="258"/>
+            <ac:spMk id="2" creationId="{6BDC634C-50DB-B8F5-D79E-D869BBD6D2D0}"/>
+          </ac:spMkLst>
+        </pc:spChg>
+        <pc:spChg chg="del">
+          <ac:chgData name="נועם ליבוביץ" userId="4c2341a7ea8aa887" providerId="LiveId" clId="{3D0969C5-1F15-4295-88FA-413B1D0F027D}" dt="2024-11-25T12:49:20.252" v="115" actId="478"/>
+          <ac:spMkLst>
+            <pc:docMk/>
+            <pc:sldMk cId="3331921883" sldId="258"/>
+            <ac:spMk id="3" creationId="{1EEF7A24-330F-F8B7-8190-3C94F078A41F}"/>
+          </ac:spMkLst>
+        </pc:spChg>
+        <pc:grpChg chg="del mod">
+          <ac:chgData name="נועם ליבוביץ" userId="4c2341a7ea8aa887" providerId="LiveId" clId="{3D0969C5-1F15-4295-88FA-413B1D0F027D}" dt="2024-11-25T12:51:33.336" v="200"/>
+          <ac:grpSpMkLst>
+            <pc:docMk/>
+            <pc:sldMk cId="3331921883" sldId="258"/>
+            <ac:grpSpMk id="14" creationId="{A18F9ED7-9C09-BBF4-BEEC-66893221F3C6}"/>
+          </ac:grpSpMkLst>
+        </pc:grpChg>
+        <pc:grpChg chg="del mod">
+          <ac:chgData name="נועם ליבוביץ" userId="4c2341a7ea8aa887" providerId="LiveId" clId="{3D0969C5-1F15-4295-88FA-413B1D0F027D}" dt="2024-11-25T12:50:18.492" v="166"/>
+          <ac:grpSpMkLst>
+            <pc:docMk/>
+            <pc:sldMk cId="3331921883" sldId="258"/>
+            <ac:grpSpMk id="18" creationId="{129E8D78-FC76-3190-9CA4-0B382CDD9169}"/>
+          </ac:grpSpMkLst>
+        </pc:grpChg>
+        <pc:grpChg chg="del mod">
+          <ac:chgData name="נועם ליבוביץ" userId="4c2341a7ea8aa887" providerId="LiveId" clId="{3D0969C5-1F15-4295-88FA-413B1D0F027D}" dt="2024-11-25T12:50:18.492" v="166"/>
+          <ac:grpSpMkLst>
+            <pc:docMk/>
+            <pc:sldMk cId="3331921883" sldId="258"/>
+            <ac:grpSpMk id="21" creationId="{717CEEF2-4F41-C93C-515F-7B2704E7BC52}"/>
+          </ac:grpSpMkLst>
+        </pc:grpChg>
+        <pc:grpChg chg="del mod">
+          <ac:chgData name="נועם ליבוביץ" userId="4c2341a7ea8aa887" providerId="LiveId" clId="{3D0969C5-1F15-4295-88FA-413B1D0F027D}" dt="2024-11-25T12:50:18.492" v="166"/>
+          <ac:grpSpMkLst>
+            <pc:docMk/>
+            <pc:sldMk cId="3331921883" sldId="258"/>
+            <ac:grpSpMk id="24" creationId="{4BE43162-6AE7-B278-C85F-F3AC7E0A84F8}"/>
+          </ac:grpSpMkLst>
+        </pc:grpChg>
+        <pc:grpChg chg="del mod">
+          <ac:chgData name="נועם ליבוביץ" userId="4c2341a7ea8aa887" providerId="LiveId" clId="{3D0969C5-1F15-4295-88FA-413B1D0F027D}" dt="2024-11-25T12:50:14.746" v="161"/>
+          <ac:grpSpMkLst>
+            <pc:docMk/>
+            <pc:sldMk cId="3331921883" sldId="258"/>
+            <ac:grpSpMk id="37" creationId="{C51BFD8E-AE63-63DB-103C-E33467BBD361}"/>
+          </ac:grpSpMkLst>
+        </pc:grpChg>
+        <pc:grpChg chg="del mod">
+          <ac:chgData name="נועם ליבוביץ" userId="4c2341a7ea8aa887" providerId="LiveId" clId="{3D0969C5-1F15-4295-88FA-413B1D0F027D}" dt="2024-11-25T12:50:59.634" v="181"/>
+          <ac:grpSpMkLst>
+            <pc:docMk/>
+            <pc:sldMk cId="3331921883" sldId="258"/>
+            <ac:grpSpMk id="41" creationId="{E2908CB9-3F0E-EFB2-1F5E-D98813E3E68C}"/>
+          </ac:grpSpMkLst>
+        </pc:grpChg>
+        <pc:grpChg chg="del mod">
+          <ac:chgData name="נועם ליבוביץ" userId="4c2341a7ea8aa887" providerId="LiveId" clId="{3D0969C5-1F15-4295-88FA-413B1D0F027D}" dt="2024-11-25T12:51:42.472" v="222"/>
+          <ac:grpSpMkLst>
+            <pc:docMk/>
+            <pc:sldMk cId="3331921883" sldId="258"/>
+            <ac:grpSpMk id="48" creationId="{4789E65B-4D11-C6EA-83F8-742C9E802188}"/>
+          </ac:grpSpMkLst>
+        </pc:grpChg>
+        <pc:grpChg chg="del mod">
+          <ac:chgData name="נועם ליבוביץ" userId="4c2341a7ea8aa887" providerId="LiveId" clId="{3D0969C5-1F15-4295-88FA-413B1D0F027D}" dt="2024-11-25T12:50:56.174" v="178"/>
+          <ac:grpSpMkLst>
+            <pc:docMk/>
+            <pc:sldMk cId="3331921883" sldId="258"/>
+            <ac:grpSpMk id="51" creationId="{44756636-045D-6A8B-3CE9-3CED97BB87DB}"/>
+          </ac:grpSpMkLst>
+        </pc:grpChg>
+        <pc:grpChg chg="del mod">
+          <ac:chgData name="נועם ליבוביץ" userId="4c2341a7ea8aa887" providerId="LiveId" clId="{3D0969C5-1F15-4295-88FA-413B1D0F027D}" dt="2024-11-25T12:51:40.731" v="217"/>
+          <ac:grpSpMkLst>
+            <pc:docMk/>
+            <pc:sldMk cId="3331921883" sldId="258"/>
+            <ac:grpSpMk id="53" creationId="{99A4C869-6438-8CF1-91C9-783D41370201}"/>
+          </ac:grpSpMkLst>
+        </pc:grpChg>
+        <pc:grpChg chg="del mod">
+          <ac:chgData name="נועם ליבוביץ" userId="4c2341a7ea8aa887" providerId="LiveId" clId="{3D0969C5-1F15-4295-88FA-413B1D0F027D}" dt="2024-11-25T12:51:23.634" v="190"/>
+          <ac:grpSpMkLst>
+            <pc:docMk/>
+            <pc:sldMk cId="3331921883" sldId="258"/>
+            <ac:grpSpMk id="58" creationId="{81B97C5F-4EC4-F84A-3060-566C28AD4728}"/>
+          </ac:grpSpMkLst>
+        </pc:grpChg>
+        <pc:grpChg chg="del mod">
+          <ac:chgData name="נועם ליבוביץ" userId="4c2341a7ea8aa887" providerId="LiveId" clId="{3D0969C5-1F15-4295-88FA-413B1D0F027D}" dt="2024-11-25T12:51:37.680" v="208"/>
+          <ac:grpSpMkLst>
+            <pc:docMk/>
+            <pc:sldMk cId="3331921883" sldId="258"/>
+            <ac:grpSpMk id="67" creationId="{271AE69D-7AB8-6864-6BCC-1CA5529E1B7B}"/>
+          </ac:grpSpMkLst>
+        </pc:grpChg>
+        <pc:grpChg chg="del mod">
+          <ac:chgData name="נועם ליבוביץ" userId="4c2341a7ea8aa887" providerId="LiveId" clId="{3D0969C5-1F15-4295-88FA-413B1D0F027D}" dt="2024-11-25T12:53:55.260" v="295"/>
+          <ac:grpSpMkLst>
+            <pc:docMk/>
+            <pc:sldMk cId="3331921883" sldId="258"/>
+            <ac:grpSpMk id="75" creationId="{3D9B258B-8EC5-B33A-E48B-4BC4AB986B17}"/>
+          </ac:grpSpMkLst>
+        </pc:grpChg>
+        <pc:grpChg chg="del mod">
+          <ac:chgData name="נועם ליבוביץ" userId="4c2341a7ea8aa887" providerId="LiveId" clId="{3D0969C5-1F15-4295-88FA-413B1D0F027D}" dt="2024-11-25T12:53:55.260" v="295"/>
+          <ac:grpSpMkLst>
+            <pc:docMk/>
+            <pc:sldMk cId="3331921883" sldId="258"/>
+            <ac:grpSpMk id="86" creationId="{CEF44D74-0F7F-F520-846A-87E3267035F8}"/>
+          </ac:grpSpMkLst>
+        </pc:grpChg>
+        <pc:grpChg chg="del mod">
+          <ac:chgData name="נועם ליבוביץ" userId="4c2341a7ea8aa887" providerId="LiveId" clId="{3D0969C5-1F15-4295-88FA-413B1D0F027D}" dt="2024-11-25T12:53:55.260" v="295"/>
+          <ac:grpSpMkLst>
+            <pc:docMk/>
+            <pc:sldMk cId="3331921883" sldId="258"/>
+            <ac:grpSpMk id="98" creationId="{81369CB1-D3D2-A090-8B74-0884FE41FB3F}"/>
+          </ac:grpSpMkLst>
+        </pc:grpChg>
+        <pc:grpChg chg="del mod">
+          <ac:chgData name="נועם ליבוביץ" userId="4c2341a7ea8aa887" providerId="LiveId" clId="{3D0969C5-1F15-4295-88FA-413B1D0F027D}" dt="2024-11-25T12:53:55.260" v="295"/>
+          <ac:grpSpMkLst>
+            <pc:docMk/>
+            <pc:sldMk cId="3331921883" sldId="258"/>
+            <ac:grpSpMk id="99" creationId="{B544BF53-D6B6-BEFD-5107-3A03070D14AC}"/>
+          </ac:grpSpMkLst>
+        </pc:grpChg>
+        <pc:grpChg chg="del mod">
+          <ac:chgData name="נועם ליבוביץ" userId="4c2341a7ea8aa887" providerId="LiveId" clId="{3D0969C5-1F15-4295-88FA-413B1D0F027D}" dt="2024-11-25T12:52:35.593" v="265"/>
+          <ac:grpSpMkLst>
+            <pc:docMk/>
+            <pc:sldMk cId="3331921883" sldId="258"/>
+            <ac:grpSpMk id="112" creationId="{BADDC7D2-0855-0AEA-448B-5E9D115ADF4F}"/>
+          </ac:grpSpMkLst>
+        </pc:grpChg>
+        <pc:grpChg chg="del mod">
+          <ac:chgData name="נועם ליבוביץ" userId="4c2341a7ea8aa887" providerId="LiveId" clId="{3D0969C5-1F15-4295-88FA-413B1D0F027D}" dt="2024-11-25T12:53:55.260" v="295"/>
+          <ac:grpSpMkLst>
+            <pc:docMk/>
+            <pc:sldMk cId="3331921883" sldId="258"/>
+            <ac:grpSpMk id="113" creationId="{A0AE007F-0CCA-04C4-A4F3-B25F27C69676}"/>
+          </ac:grpSpMkLst>
+        </pc:grpChg>
+        <pc:grpChg chg="del mod">
+          <ac:chgData name="נועם ליבוביץ" userId="4c2341a7ea8aa887" providerId="LiveId" clId="{3D0969C5-1F15-4295-88FA-413B1D0F027D}" dt="2024-11-25T12:53:55.260" v="295"/>
+          <ac:grpSpMkLst>
+            <pc:docMk/>
+            <pc:sldMk cId="3331921883" sldId="258"/>
+            <ac:grpSpMk id="118" creationId="{807A7F47-BD81-074D-B71A-47947517A4D9}"/>
+          </ac:grpSpMkLst>
+        </pc:grpChg>
+        <pc:grpChg chg="del mod">
+          <ac:chgData name="נועם ליבוביץ" userId="4c2341a7ea8aa887" providerId="LiveId" clId="{3D0969C5-1F15-4295-88FA-413B1D0F027D}" dt="2024-11-25T12:53:55.260" v="295"/>
+          <ac:grpSpMkLst>
+            <pc:docMk/>
+            <pc:sldMk cId="3331921883" sldId="258"/>
+            <ac:grpSpMk id="125" creationId="{7F2A7044-9B3C-C9C8-CD92-0BFDCA0B3138}"/>
+          </ac:grpSpMkLst>
+        </pc:grpChg>
+        <pc:grpChg chg="del mod">
+          <ac:chgData name="נועם ליבוביץ" userId="4c2341a7ea8aa887" providerId="LiveId" clId="{3D0969C5-1F15-4295-88FA-413B1D0F027D}" dt="2024-11-25T12:52:58.089" v="281"/>
+          <ac:grpSpMkLst>
+            <pc:docMk/>
+            <pc:sldMk cId="3331921883" sldId="258"/>
+            <ac:grpSpMk id="131" creationId="{F8529417-AA89-C5C5-D96C-6173F810E6CB}"/>
+          </ac:grpSpMkLst>
+        </pc:grpChg>
+        <pc:grpChg chg="del mod">
+          <ac:chgData name="נועם ליבוביץ" userId="4c2341a7ea8aa887" providerId="LiveId" clId="{3D0969C5-1F15-4295-88FA-413B1D0F027D}" dt="2024-11-25T12:53:55.260" v="295"/>
+          <ac:grpSpMkLst>
+            <pc:docMk/>
+            <pc:sldMk cId="3331921883" sldId="258"/>
+            <ac:grpSpMk id="133" creationId="{1D314BDB-C509-922D-D776-74385711563E}"/>
+          </ac:grpSpMkLst>
+        </pc:grpChg>
+        <pc:grpChg chg="del mod">
+          <ac:chgData name="נועם ליבוביץ" userId="4c2341a7ea8aa887" providerId="LiveId" clId="{3D0969C5-1F15-4295-88FA-413B1D0F027D}" dt="2024-11-25T12:53:04.793" v="290"/>
+          <ac:grpSpMkLst>
+            <pc:docMk/>
+            <pc:sldMk cId="3331921883" sldId="258"/>
+            <ac:grpSpMk id="139" creationId="{B8A4174F-30CD-C301-98A5-F700FAD75537}"/>
+          </ac:grpSpMkLst>
+        </pc:grpChg>
+        <pc:grpChg chg="del mod">
+          <ac:chgData name="נועם ליבוביץ" userId="4c2341a7ea8aa887" providerId="LiveId" clId="{3D0969C5-1F15-4295-88FA-413B1D0F027D}" dt="2024-11-25T12:53:55.260" v="295"/>
+          <ac:grpSpMkLst>
+            <pc:docMk/>
+            <pc:sldMk cId="3331921883" sldId="258"/>
+            <ac:grpSpMk id="142" creationId="{0085606C-DFCA-8617-68A2-E27B608CA515}"/>
+          </ac:grpSpMkLst>
+        </pc:grpChg>
+        <pc:grpChg chg="del mod">
+          <ac:chgData name="נועם ליבוביץ" userId="4c2341a7ea8aa887" providerId="LiveId" clId="{3D0969C5-1F15-4295-88FA-413B1D0F027D}" dt="2024-11-25T12:53:59.309" v="297"/>
+          <ac:grpSpMkLst>
+            <pc:docMk/>
+            <pc:sldMk cId="3331921883" sldId="258"/>
+            <ac:grpSpMk id="144" creationId="{4ECA5032-F73B-7CC0-1509-CB81EC74BBD8}"/>
+          </ac:grpSpMkLst>
+        </pc:grpChg>
+        <pc:grpChg chg="del mod">
+          <ac:chgData name="נועם ליבוביץ" userId="4c2341a7ea8aa887" providerId="LiveId" clId="{3D0969C5-1F15-4295-88FA-413B1D0F027D}" dt="2024-11-25T12:57:49.266" v="450"/>
+          <ac:grpSpMkLst>
+            <pc:docMk/>
+            <pc:sldMk cId="3331921883" sldId="258"/>
+            <ac:grpSpMk id="146" creationId="{D8580B00-4DCA-7EE6-DEBE-4BA255A7C1C7}"/>
+          </ac:grpSpMkLst>
+        </pc:grpChg>
+        <pc:grpChg chg="mod">
+          <ac:chgData name="נועם ליבוביץ" userId="4c2341a7ea8aa887" providerId="LiveId" clId="{3D0969C5-1F15-4295-88FA-413B1D0F027D}" dt="2024-11-25T12:54:05.898" v="301"/>
+          <ac:grpSpMkLst>
+            <pc:docMk/>
+            <pc:sldMk cId="3331921883" sldId="258"/>
+            <ac:grpSpMk id="148" creationId="{C3E78B9F-95BF-65E9-2DFC-CC1AD73BE7B9}"/>
+          </ac:grpSpMkLst>
+        </pc:grpChg>
+        <pc:grpChg chg="mod">
+          <ac:chgData name="נועם ליבוביץ" userId="4c2341a7ea8aa887" providerId="LiveId" clId="{3D0969C5-1F15-4295-88FA-413B1D0F027D}" dt="2024-11-25T12:54:30.825" v="307"/>
+          <ac:grpSpMkLst>
+            <pc:docMk/>
+            <pc:sldMk cId="3331921883" sldId="258"/>
+            <ac:grpSpMk id="152" creationId="{B60C570A-4E14-A04C-56F7-3C7503A63DFE}"/>
+          </ac:grpSpMkLst>
+        </pc:grpChg>
+        <pc:grpChg chg="del mod">
+          <ac:chgData name="נועם ליבוביץ" userId="4c2341a7ea8aa887" providerId="LiveId" clId="{3D0969C5-1F15-4295-88FA-413B1D0F027D}" dt="2024-11-25T12:57:49.267" v="457"/>
+          <ac:grpSpMkLst>
+            <pc:docMk/>
+            <pc:sldMk cId="3331921883" sldId="258"/>
+            <ac:grpSpMk id="162" creationId="{76A124FE-AD1B-0736-C1BF-F4242124284A}"/>
+          </ac:grpSpMkLst>
+        </pc:grpChg>
+        <pc:grpChg chg="del mod">
+          <ac:chgData name="נועם ליבוביץ" userId="4c2341a7ea8aa887" providerId="LiveId" clId="{3D0969C5-1F15-4295-88FA-413B1D0F027D}" dt="2024-11-25T12:55:33.376" v="339"/>
+          <ac:grpSpMkLst>
+            <pc:docMk/>
+            <pc:sldMk cId="3331921883" sldId="258"/>
+            <ac:grpSpMk id="167" creationId="{58EBC458-E9C3-364D-7730-949B72528A45}"/>
+          </ac:grpSpMkLst>
+        </pc:grpChg>
+        <pc:grpChg chg="del mod">
+          <ac:chgData name="נועם ליבוביץ" userId="4c2341a7ea8aa887" providerId="LiveId" clId="{3D0969C5-1F15-4295-88FA-413B1D0F027D}" dt="2024-11-25T12:57:49.268" v="465"/>
+          <ac:grpSpMkLst>
+            <pc:docMk/>
+            <pc:sldMk cId="3331921883" sldId="258"/>
+            <ac:grpSpMk id="177" creationId="{8D8154C9-66D6-AE0A-34E6-B7F733DB86C7}"/>
+          </ac:grpSpMkLst>
+        </pc:grpChg>
+        <pc:grpChg chg="del mod">
+          <ac:chgData name="נועם ליבוביץ" userId="4c2341a7ea8aa887" providerId="LiveId" clId="{3D0969C5-1F15-4295-88FA-413B1D0F027D}" dt="2024-11-25T12:55:41.571" v="342"/>
+          <ac:grpSpMkLst>
+            <pc:docMk/>
+            <pc:sldMk cId="3331921883" sldId="258"/>
+            <ac:grpSpMk id="178" creationId="{F3E4A859-F50D-F28A-4BDE-1B24C40341E8}"/>
+          </ac:grpSpMkLst>
+        </pc:grpChg>
+        <pc:grpChg chg="del mod">
+          <ac:chgData name="נועם ליבוביץ" userId="4c2341a7ea8aa887" providerId="LiveId" clId="{3D0969C5-1F15-4295-88FA-413B1D0F027D}" dt="2024-11-25T12:57:49.263" v="430"/>
+          <ac:grpSpMkLst>
+            <pc:docMk/>
+            <pc:sldMk cId="3331921883" sldId="258"/>
+            <ac:grpSpMk id="181" creationId="{5ED94BA7-C43D-F297-554B-56693D4C5785}"/>
+          </ac:grpSpMkLst>
+        </pc:grpChg>
+        <pc:grpChg chg="del mod">
+          <ac:chgData name="נועם ליבוביץ" userId="4c2341a7ea8aa887" providerId="LiveId" clId="{3D0969C5-1F15-4295-88FA-413B1D0F027D}" dt="2024-11-25T12:57:49.268" v="462"/>
+          <ac:grpSpMkLst>
+            <pc:docMk/>
+            <pc:sldMk cId="3331921883" sldId="258"/>
+            <ac:grpSpMk id="192" creationId="{CF749E13-0C9B-D16E-6C29-AD1E8D5F92C0}"/>
+          </ac:grpSpMkLst>
+        </pc:grpChg>
+        <pc:picChg chg="add del mod">
+          <ac:chgData name="נועם ליבוביץ" userId="4c2341a7ea8aa887" providerId="LiveId" clId="{3D0969C5-1F15-4295-88FA-413B1D0F027D}" dt="2024-11-25T12:57:59.714" v="482" actId="478"/>
+          <ac:picMkLst>
+            <pc:docMk/>
+            <pc:sldMk cId="3331921883" sldId="258"/>
+            <ac:picMk id="5" creationId="{A4AEEEAC-C79B-7C70-2E58-4640EB8AFB94}"/>
+          </ac:picMkLst>
+        </pc:picChg>
+        <pc:inkChg chg="add del mod">
+          <ac:chgData name="נועם ליבוביץ" userId="4c2341a7ea8aa887" providerId="LiveId" clId="{3D0969C5-1F15-4295-88FA-413B1D0F027D}" dt="2024-11-25T12:57:49.262" v="420"/>
+          <ac:inkMkLst>
+            <pc:docMk/>
+            <pc:sldMk cId="3331921883" sldId="258"/>
+            <ac:inkMk id="6" creationId="{AB60A4C6-C7EE-3E4F-B2D1-47BAE1CE233C}"/>
+          </ac:inkMkLst>
+        </pc:inkChg>
+        <pc:inkChg chg="add del mod">
+          <ac:chgData name="נועם ליבוביץ" userId="4c2341a7ea8aa887" providerId="LiveId" clId="{3D0969C5-1F15-4295-88FA-413B1D0F027D}" dt="2024-11-25T12:57:49.266" v="449"/>
+          <ac:inkMkLst>
+            <pc:docMk/>
+            <pc:sldMk cId="3331921883" sldId="258"/>
+            <ac:inkMk id="7" creationId="{BDC63225-689E-F85A-B40E-D5964E887A21}"/>
+          </ac:inkMkLst>
+        </pc:inkChg>
+        <pc:inkChg chg="add del mod">
+          <ac:chgData name="נועם ליבוביץ" userId="4c2341a7ea8aa887" providerId="LiveId" clId="{3D0969C5-1F15-4295-88FA-413B1D0F027D}" dt="2024-11-25T12:57:49.270" v="470"/>
+          <ac:inkMkLst>
+            <pc:docMk/>
+            <pc:sldMk cId="3331921883" sldId="258"/>
+            <ac:inkMk id="8" creationId="{B499D45E-5ED7-8AD0-0C58-A9C55989877B}"/>
+          </ac:inkMkLst>
+        </pc:inkChg>
+        <pc:inkChg chg="add del mod">
+          <ac:chgData name="נועם ליבוביץ" userId="4c2341a7ea8aa887" providerId="LiveId" clId="{3D0969C5-1F15-4295-88FA-413B1D0F027D}" dt="2024-11-25T12:57:49.258" v="389"/>
+          <ac:inkMkLst>
+            <pc:docMk/>
+            <pc:sldMk cId="3331921883" sldId="258"/>
+            <ac:inkMk id="9" creationId="{1351C92A-9F15-57F4-89B7-6F3374BB4C48}"/>
+          </ac:inkMkLst>
+        </pc:inkChg>
+        <pc:inkChg chg="add del mod">
+          <ac:chgData name="נועם ליבוביץ" userId="4c2341a7ea8aa887" providerId="LiveId" clId="{3D0969C5-1F15-4295-88FA-413B1D0F027D}" dt="2024-11-25T12:57:49.255" v="368"/>
+          <ac:inkMkLst>
+            <pc:docMk/>
+            <pc:sldMk cId="3331921883" sldId="258"/>
+            <ac:inkMk id="10" creationId="{34FB4B6B-3158-0E81-4D13-8B032CF41FC9}"/>
+          </ac:inkMkLst>
+        </pc:inkChg>
+        <pc:inkChg chg="add del mod">
+          <ac:chgData name="נועם ליבוביץ" userId="4c2341a7ea8aa887" providerId="LiveId" clId="{3D0969C5-1F15-4295-88FA-413B1D0F027D}" dt="2024-11-25T12:57:49.257" v="385"/>
+          <ac:inkMkLst>
+            <pc:docMk/>
+            <pc:sldMk cId="3331921883" sldId="258"/>
+            <ac:inkMk id="11" creationId="{4BDDD1DE-E6D4-1C09-9EDF-A91CCDC06B2F}"/>
+          </ac:inkMkLst>
+        </pc:inkChg>
+        <pc:inkChg chg="add del mod">
+          <ac:chgData name="נועם ליבוביץ" userId="4c2341a7ea8aa887" providerId="LiveId" clId="{3D0969C5-1F15-4295-88FA-413B1D0F027D}" dt="2024-11-25T12:57:49.267" v="453"/>
+          <ac:inkMkLst>
+            <pc:docMk/>
+            <pc:sldMk cId="3331921883" sldId="258"/>
+            <ac:inkMk id="12" creationId="{90A778A1-6BF2-24C2-F805-1FAA00A378EF}"/>
+          </ac:inkMkLst>
+        </pc:inkChg>
+        <pc:inkChg chg="add del mod">
+          <ac:chgData name="נועם ליבוביץ" userId="4c2341a7ea8aa887" providerId="LiveId" clId="{3D0969C5-1F15-4295-88FA-413B1D0F027D}" dt="2024-11-25T12:57:49.262" v="419"/>
+          <ac:inkMkLst>
+            <pc:docMk/>
+            <pc:sldMk cId="3331921883" sldId="258"/>
+            <ac:inkMk id="13" creationId="{7B0F1EFE-A565-2821-D3FF-BEFF6FA2C87F}"/>
+          </ac:inkMkLst>
+        </pc:inkChg>
+        <pc:inkChg chg="add del mod">
+          <ac:chgData name="נועם ליבוביץ" userId="4c2341a7ea8aa887" providerId="LiveId" clId="{3D0969C5-1F15-4295-88FA-413B1D0F027D}" dt="2024-11-25T12:51:40.731" v="218"/>
+          <ac:inkMkLst>
+            <pc:docMk/>
+            <pc:sldMk cId="3331921883" sldId="258"/>
+            <ac:inkMk id="15" creationId="{619FFD6A-DD62-F1FC-A4C1-A469FF2D22BD}"/>
+          </ac:inkMkLst>
+        </pc:inkChg>
+        <pc:inkChg chg="add del mod">
+          <ac:chgData name="נועם ליבוביץ" userId="4c2341a7ea8aa887" providerId="LiveId" clId="{3D0969C5-1F15-4295-88FA-413B1D0F027D}" dt="2024-11-25T12:51:40.730" v="211"/>
+          <ac:inkMkLst>
+            <pc:docMk/>
+            <pc:sldMk cId="3331921883" sldId="258"/>
+            <ac:inkMk id="16" creationId="{B8A7B92A-FF90-7F34-CA87-387AFDF1319C}"/>
+          </ac:inkMkLst>
+        </pc:inkChg>
+        <pc:inkChg chg="add del mod">
+          <ac:chgData name="נועם ליבוביץ" userId="4c2341a7ea8aa887" providerId="LiveId" clId="{3D0969C5-1F15-4295-88FA-413B1D0F027D}" dt="2024-11-25T12:51:40.730" v="214"/>
+          <ac:inkMkLst>
+            <pc:docMk/>
+            <pc:sldMk cId="3331921883" sldId="258"/>
+            <ac:inkMk id="17" creationId="{BE015FE7-3280-C6CD-A1CE-4E85C09FB1D9}"/>
+          </ac:inkMkLst>
+        </pc:inkChg>
+        <pc:inkChg chg="add del mod">
+          <ac:chgData name="נועם ליבוביץ" userId="4c2341a7ea8aa887" providerId="LiveId" clId="{3D0969C5-1F15-4295-88FA-413B1D0F027D}" dt="2024-11-25T12:51:40.731" v="217"/>
+          <ac:inkMkLst>
+            <pc:docMk/>
+            <pc:sldMk cId="3331921883" sldId="258"/>
+            <ac:inkMk id="19" creationId="{CDC51339-DB22-B55C-7A09-084DBB441C0E}"/>
+          </ac:inkMkLst>
+        </pc:inkChg>
+        <pc:inkChg chg="add del mod">
+          <ac:chgData name="נועם ליבוביץ" userId="4c2341a7ea8aa887" providerId="LiveId" clId="{3D0969C5-1F15-4295-88FA-413B1D0F027D}" dt="2024-11-25T12:51:40.731" v="215"/>
+          <ac:inkMkLst>
+            <pc:docMk/>
+            <pc:sldMk cId="3331921883" sldId="258"/>
+            <ac:inkMk id="20" creationId="{DF398272-7C9E-88FD-3DCD-01417038C03A}"/>
+          </ac:inkMkLst>
+        </pc:inkChg>
+        <pc:inkChg chg="add del mod">
+          <ac:chgData name="נועם ליבוביץ" userId="4c2341a7ea8aa887" providerId="LiveId" clId="{3D0969C5-1F15-4295-88FA-413B1D0F027D}" dt="2024-11-25T12:51:40.730" v="213"/>
+          <ac:inkMkLst>
+            <pc:docMk/>
+            <pc:sldMk cId="3331921883" sldId="258"/>
+            <ac:inkMk id="22" creationId="{F9014435-B897-C5E9-B825-5A7B7F76D382}"/>
+          </ac:inkMkLst>
+        </pc:inkChg>
+        <pc:inkChg chg="add del mod">
+          <ac:chgData name="נועם ליבוביץ" userId="4c2341a7ea8aa887" providerId="LiveId" clId="{3D0969C5-1F15-4295-88FA-413B1D0F027D}" dt="2024-11-25T12:51:40.730" v="212"/>
+          <ac:inkMkLst>
+            <pc:docMk/>
+            <pc:sldMk cId="3331921883" sldId="258"/>
+            <ac:inkMk id="23" creationId="{6B9D9985-0CD4-CCB0-CFB8-B95629565CEC}"/>
+          </ac:inkMkLst>
+        </pc:inkChg>
+        <pc:inkChg chg="add del mod">
+          <ac:chgData name="נועם ליבוביץ" userId="4c2341a7ea8aa887" providerId="LiveId" clId="{3D0969C5-1F15-4295-88FA-413B1D0F027D}" dt="2024-11-25T12:50:14.746" v="160"/>
+          <ac:inkMkLst>
+            <pc:docMk/>
+            <pc:sldMk cId="3331921883" sldId="258"/>
+            <ac:inkMk id="25" creationId="{98A2EC04-5514-B51E-B5F7-89DE21260C39}"/>
+          </ac:inkMkLst>
+        </pc:inkChg>
+        <pc:inkChg chg="add del mod">
+          <ac:chgData name="נועם ליבוביץ" userId="4c2341a7ea8aa887" providerId="LiveId" clId="{3D0969C5-1F15-4295-88FA-413B1D0F027D}" dt="2024-11-25T12:50:14.746" v="159"/>
+          <ac:inkMkLst>
+            <pc:docMk/>
+            <pc:sldMk cId="3331921883" sldId="258"/>
+            <ac:inkMk id="26" creationId="{090E91AD-2EAD-AFE0-CFB4-D63813B22B01}"/>
+          </ac:inkMkLst>
+        </pc:inkChg>
+        <pc:inkChg chg="add del mod">
+          <ac:chgData name="נועם ליבוביץ" userId="4c2341a7ea8aa887" providerId="LiveId" clId="{3D0969C5-1F15-4295-88FA-413B1D0F027D}" dt="2024-11-25T12:50:14.744" v="152"/>
+          <ac:inkMkLst>
+            <pc:docMk/>
+            <pc:sldMk cId="3331921883" sldId="258"/>
+            <ac:inkMk id="27" creationId="{65D7BBCC-9211-15E8-EB3F-21A533DC1BF7}"/>
+          </ac:inkMkLst>
+        </pc:inkChg>
+        <pc:inkChg chg="add del mod">
+          <ac:chgData name="נועם ליבוביץ" userId="4c2341a7ea8aa887" providerId="LiveId" clId="{3D0969C5-1F15-4295-88FA-413B1D0F027D}" dt="2024-11-25T12:50:14.745" v="155"/>
+          <ac:inkMkLst>
+            <pc:docMk/>
+            <pc:sldMk cId="3331921883" sldId="258"/>
+            <ac:inkMk id="28" creationId="{894F4E37-F9AC-58B3-D63D-175BA596A850}"/>
+          </ac:inkMkLst>
+        </pc:inkChg>
+        <pc:inkChg chg="add del mod">
+          <ac:chgData name="נועם ליבוביץ" userId="4c2341a7ea8aa887" providerId="LiveId" clId="{3D0969C5-1F15-4295-88FA-413B1D0F027D}" dt="2024-11-25T12:50:14.746" v="161"/>
+          <ac:inkMkLst>
+            <pc:docMk/>
+            <pc:sldMk cId="3331921883" sldId="258"/>
+            <ac:inkMk id="29" creationId="{3F5814CF-DBB3-224E-0DFE-1BFEE4840DAD}"/>
+          </ac:inkMkLst>
+        </pc:inkChg>
+        <pc:inkChg chg="add del mod">
+          <ac:chgData name="נועם ליבוביץ" userId="4c2341a7ea8aa887" providerId="LiveId" clId="{3D0969C5-1F15-4295-88FA-413B1D0F027D}" dt="2024-11-25T12:50:14.746" v="156"/>
+          <ac:inkMkLst>
+            <pc:docMk/>
+            <pc:sldMk cId="3331921883" sldId="258"/>
+            <ac:inkMk id="30" creationId="{52FF8063-CB7A-E20F-ED24-3881D3827532}"/>
+          </ac:inkMkLst>
+        </pc:inkChg>
+        <pc:inkChg chg="add del mod">
+          <ac:chgData name="נועם ליבוביץ" userId="4c2341a7ea8aa887" providerId="LiveId" clId="{3D0969C5-1F15-4295-88FA-413B1D0F027D}" dt="2024-11-25T12:50:14.744" v="151"/>
+          <ac:inkMkLst>
+            <pc:docMk/>
+            <pc:sldMk cId="3331921883" sldId="258"/>
+            <ac:inkMk id="31" creationId="{F43A6E95-2060-18DA-93C1-68D91919CF86}"/>
+          </ac:inkMkLst>
+        </pc:inkChg>
+        <pc:inkChg chg="add del mod">
+          <ac:chgData name="נועם ליבוביץ" userId="4c2341a7ea8aa887" providerId="LiveId" clId="{3D0969C5-1F15-4295-88FA-413B1D0F027D}" dt="2024-11-25T12:50:14.745" v="154"/>
+          <ac:inkMkLst>
+            <pc:docMk/>
+            <pc:sldMk cId="3331921883" sldId="258"/>
+            <ac:inkMk id="32" creationId="{E931ED0C-7539-60FD-9936-8C51ED632FD1}"/>
+          </ac:inkMkLst>
+        </pc:inkChg>
+        <pc:inkChg chg="add del mod">
+          <ac:chgData name="נועם ליבוביץ" userId="4c2341a7ea8aa887" providerId="LiveId" clId="{3D0969C5-1F15-4295-88FA-413B1D0F027D}" dt="2024-11-25T12:50:14.746" v="162"/>
+          <ac:inkMkLst>
+            <pc:docMk/>
+            <pc:sldMk cId="3331921883" sldId="258"/>
+            <ac:inkMk id="33" creationId="{5A5FFE12-8FEF-F5F0-E9F0-FF580BF87ADE}"/>
+          </ac:inkMkLst>
+        </pc:inkChg>
+        <pc:inkChg chg="add del mod">
+          <ac:chgData name="נועם ליבוביץ" userId="4c2341a7ea8aa887" providerId="LiveId" clId="{3D0969C5-1F15-4295-88FA-413B1D0F027D}" dt="2024-11-25T12:50:14.746" v="157"/>
+          <ac:inkMkLst>
+            <pc:docMk/>
+            <pc:sldMk cId="3331921883" sldId="258"/>
+            <ac:inkMk id="34" creationId="{D7183F74-76B1-0AE9-FB27-CD1BEBC29F26}"/>
+          </ac:inkMkLst>
+        </pc:inkChg>
+        <pc:inkChg chg="add del mod">
+          <ac:chgData name="נועם ליבוביץ" userId="4c2341a7ea8aa887" providerId="LiveId" clId="{3D0969C5-1F15-4295-88FA-413B1D0F027D}" dt="2024-11-25T12:50:14.746" v="158"/>
+          <ac:inkMkLst>
+            <pc:docMk/>
+            <pc:sldMk cId="3331921883" sldId="258"/>
+            <ac:inkMk id="35" creationId="{713674B2-007C-AFD0-30CB-9585BC64288B}"/>
+          </ac:inkMkLst>
+        </pc:inkChg>
+        <pc:inkChg chg="add del mod">
+          <ac:chgData name="נועם ליבוביץ" userId="4c2341a7ea8aa887" providerId="LiveId" clId="{3D0969C5-1F15-4295-88FA-413B1D0F027D}" dt="2024-11-25T12:50:14.745" v="153"/>
+          <ac:inkMkLst>
+            <pc:docMk/>
+            <pc:sldMk cId="3331921883" sldId="258"/>
+            <ac:inkMk id="36" creationId="{82BF6BD9-F9E1-0BE3-2235-DCADCCE32EBD}"/>
+          </ac:inkMkLst>
+        </pc:inkChg>
+        <pc:inkChg chg="add del mod">
+          <ac:chgData name="נועם ליבוביץ" userId="4c2341a7ea8aa887" providerId="LiveId" clId="{3D0969C5-1F15-4295-88FA-413B1D0F027D}" dt="2024-11-25T12:51:40.730" v="210"/>
+          <ac:inkMkLst>
+            <pc:docMk/>
+            <pc:sldMk cId="3331921883" sldId="258"/>
+            <ac:inkMk id="38" creationId="{AF2EBDA6-44AA-6CAD-24C2-E48AA33B08B3}"/>
+          </ac:inkMkLst>
+        </pc:inkChg>
+        <pc:inkChg chg="add del mod">
+          <ac:chgData name="נועם ליבוביץ" userId="4c2341a7ea8aa887" providerId="LiveId" clId="{3D0969C5-1F15-4295-88FA-413B1D0F027D}" dt="2024-11-25T12:51:40.731" v="216"/>
+          <ac:inkMkLst>
+            <pc:docMk/>
+            <pc:sldMk cId="3331921883" sldId="258"/>
+            <ac:inkMk id="39" creationId="{D57D7039-3FEA-CB87-45D9-38A943A32DD2}"/>
+          </ac:inkMkLst>
+        </pc:inkChg>
+        <pc:inkChg chg="add del mod">
+          <ac:chgData name="נועם ליבוביץ" userId="4c2341a7ea8aa887" providerId="LiveId" clId="{3D0969C5-1F15-4295-88FA-413B1D0F027D}" dt="2024-11-25T12:51:40.730" v="209"/>
+          <ac:inkMkLst>
+            <pc:docMk/>
+            <pc:sldMk cId="3331921883" sldId="258"/>
+            <ac:inkMk id="40" creationId="{D0B3316D-E550-B430-7041-9BB021414675}"/>
+          </ac:inkMkLst>
+        </pc:inkChg>
+        <pc:inkChg chg="add del">
+          <ac:chgData name="נועם ליבוביץ" userId="4c2341a7ea8aa887" providerId="LiveId" clId="{3D0969C5-1F15-4295-88FA-413B1D0F027D}" dt="2024-11-25T12:50:40.205" v="168"/>
+          <ac:inkMkLst>
+            <pc:docMk/>
+            <pc:sldMk cId="3331921883" sldId="258"/>
+            <ac:inkMk id="42" creationId="{DE56C7DD-900C-3E0A-4833-B1FFC92F16CE}"/>
+          </ac:inkMkLst>
+        </pc:inkChg>
+        <pc:inkChg chg="add del mod">
+          <ac:chgData name="נועם ליבוביץ" userId="4c2341a7ea8aa887" providerId="LiveId" clId="{3D0969C5-1F15-4295-88FA-413B1D0F027D}" dt="2024-11-25T12:51:42.472" v="221"/>
+          <ac:inkMkLst>
+            <pc:docMk/>
+            <pc:sldMk cId="3331921883" sldId="258"/>
+            <ac:inkMk id="43" creationId="{838A5B72-9CE3-6548-ED71-3E7BE8B2D584}"/>
+          </ac:inkMkLst>
+        </pc:inkChg>
+        <pc:inkChg chg="add del mod">
+          <ac:chgData name="נועם ליבוביץ" userId="4c2341a7ea8aa887" providerId="LiveId" clId="{3D0969C5-1F15-4295-88FA-413B1D0F027D}" dt="2024-11-25T12:51:42.472" v="223"/>
+          <ac:inkMkLst>
+            <pc:docMk/>
+            <pc:sldMk cId="3331921883" sldId="258"/>
+            <ac:inkMk id="44" creationId="{0076B748-0663-3296-1A92-861564B2EBE3}"/>
+          </ac:inkMkLst>
+        </pc:inkChg>
+        <pc:inkChg chg="add del mod">
+          <ac:chgData name="נועם ליבוביץ" userId="4c2341a7ea8aa887" providerId="LiveId" clId="{3D0969C5-1F15-4295-88FA-413B1D0F027D}" dt="2024-11-25T12:51:42.472" v="222"/>
+          <ac:inkMkLst>
+            <pc:docMk/>
+            <pc:sldMk cId="3331921883" sldId="258"/>
+            <ac:inkMk id="45" creationId="{006F9BDC-CF85-9ED0-8572-4B498EFAFE0B}"/>
+          </ac:inkMkLst>
+        </pc:inkChg>
+        <pc:inkChg chg="add del mod">
+          <ac:chgData name="נועם ליבוביץ" userId="4c2341a7ea8aa887" providerId="LiveId" clId="{3D0969C5-1F15-4295-88FA-413B1D0F027D}" dt="2024-11-25T12:51:42.472" v="220"/>
+          <ac:inkMkLst>
+            <pc:docMk/>
+            <pc:sldMk cId="3331921883" sldId="258"/>
+            <ac:inkMk id="46" creationId="{EB5BE49A-8643-D669-D773-57F8E25905CD}"/>
+          </ac:inkMkLst>
+        </pc:inkChg>
+        <pc:inkChg chg="add del mod">
+          <ac:chgData name="נועם ליבוביץ" userId="4c2341a7ea8aa887" providerId="LiveId" clId="{3D0969C5-1F15-4295-88FA-413B1D0F027D}" dt="2024-11-25T12:51:42.471" v="219"/>
+          <ac:inkMkLst>
+            <pc:docMk/>
+            <pc:sldMk cId="3331921883" sldId="258"/>
+            <ac:inkMk id="47" creationId="{C01ECBA4-34A0-62D8-EA56-E79369F555C4}"/>
+          </ac:inkMkLst>
+        </pc:inkChg>
+        <pc:inkChg chg="add del mod">
+          <ac:chgData name="נועם ליבוביץ" userId="4c2341a7ea8aa887" providerId="LiveId" clId="{3D0969C5-1F15-4295-88FA-413B1D0F027D}" dt="2024-11-25T12:50:56.174" v="178"/>
+          <ac:inkMkLst>
+            <pc:docMk/>
+            <pc:sldMk cId="3331921883" sldId="258"/>
+            <ac:inkMk id="49" creationId="{306F4284-3EC2-5DB8-505B-2531A21F076B}"/>
+          </ac:inkMkLst>
+        </pc:inkChg>
+        <pc:inkChg chg="add del mod">
+          <ac:chgData name="נועם ליבוביץ" userId="4c2341a7ea8aa887" providerId="LiveId" clId="{3D0969C5-1F15-4295-88FA-413B1D0F027D}" dt="2024-11-25T12:50:56.174" v="179"/>
+          <ac:inkMkLst>
+            <pc:docMk/>
+            <pc:sldMk cId="3331921883" sldId="258"/>
+            <ac:inkMk id="50" creationId="{846F5E84-F210-690B-8A4D-1026DA94A881}"/>
+          </ac:inkMkLst>
+        </pc:inkChg>
+        <pc:inkChg chg="add del mod">
+          <ac:chgData name="נועם ליבוביץ" userId="4c2341a7ea8aa887" providerId="LiveId" clId="{3D0969C5-1F15-4295-88FA-413B1D0F027D}" dt="2024-11-25T12:51:04.241" v="182"/>
+          <ac:inkMkLst>
+            <pc:docMk/>
+            <pc:sldMk cId="3331921883" sldId="258"/>
+            <ac:inkMk id="52" creationId="{840F1F01-4D01-BFDB-3B6F-285C2067DC01}"/>
+          </ac:inkMkLst>
+        </pc:inkChg>
+        <pc:inkChg chg="add del">
+          <ac:chgData name="נועם ליבוביץ" userId="4c2341a7ea8aa887" providerId="LiveId" clId="{3D0969C5-1F15-4295-88FA-413B1D0F027D}" dt="2024-11-25T12:51:22.875" v="188"/>
+          <ac:inkMkLst>
+            <pc:docMk/>
+            <pc:sldMk cId="3331921883" sldId="258"/>
+            <ac:inkMk id="54" creationId="{E49E45B9-3F82-60FC-8E0B-0FE49084092C}"/>
+          </ac:inkMkLst>
+        </pc:inkChg>
+        <pc:inkChg chg="add del mod">
+          <ac:chgData name="נועם ליבוביץ" userId="4c2341a7ea8aa887" providerId="LiveId" clId="{3D0969C5-1F15-4295-88FA-413B1D0F027D}" dt="2024-11-25T12:51:23.634" v="190"/>
+          <ac:inkMkLst>
+            <pc:docMk/>
+            <pc:sldMk cId="3331921883" sldId="258"/>
+            <ac:inkMk id="55" creationId="{6AD0048F-A7AA-C235-9B71-5BC1A8BD1CC3}"/>
+          </ac:inkMkLst>
+        </pc:inkChg>
+        <pc:inkChg chg="add del mod">
+          <ac:chgData name="נועם ליבוביץ" userId="4c2341a7ea8aa887" providerId="LiveId" clId="{3D0969C5-1F15-4295-88FA-413B1D0F027D}" dt="2024-11-25T12:51:23.634" v="191"/>
+          <ac:inkMkLst>
+            <pc:docMk/>
+            <pc:sldMk cId="3331921883" sldId="258"/>
+            <ac:inkMk id="56" creationId="{AAD0C9CF-42F9-3570-8AEF-6B8D28D1F2B6}"/>
+          </ac:inkMkLst>
+        </pc:inkChg>
+        <pc:inkChg chg="add del mod">
+          <ac:chgData name="נועם ליבוביץ" userId="4c2341a7ea8aa887" providerId="LiveId" clId="{3D0969C5-1F15-4295-88FA-413B1D0F027D}" dt="2024-11-25T12:51:23.633" v="189"/>
+          <ac:inkMkLst>
+            <pc:docMk/>
+            <pc:sldMk cId="3331921883" sldId="258"/>
+            <ac:inkMk id="57" creationId="{40952631-50B6-803A-372D-1E65D9243E3B}"/>
+          </ac:inkMkLst>
+        </pc:inkChg>
+        <pc:inkChg chg="add del mod">
+          <ac:chgData name="נועם ליבוביץ" userId="4c2341a7ea8aa887" providerId="LiveId" clId="{3D0969C5-1F15-4295-88FA-413B1D0F027D}" dt="2024-11-25T12:57:49.261" v="411"/>
+          <ac:inkMkLst>
+            <pc:docMk/>
+            <pc:sldMk cId="3331921883" sldId="258"/>
+            <ac:inkMk id="59" creationId="{55A7E824-7C43-ABB4-DD55-4E1E6D13210F}"/>
+          </ac:inkMkLst>
+        </pc:inkChg>
+        <pc:inkChg chg="add del mod">
+          <ac:chgData name="נועם ליבוביץ" userId="4c2341a7ea8aa887" providerId="LiveId" clId="{3D0969C5-1F15-4295-88FA-413B1D0F027D}" dt="2024-11-25T12:57:49.265" v="445"/>
+          <ac:inkMkLst>
+            <pc:docMk/>
+            <pc:sldMk cId="3331921883" sldId="258"/>
+            <ac:inkMk id="60" creationId="{91924F34-261E-ECCA-5C65-B6DD505CF31F}"/>
+          </ac:inkMkLst>
+        </pc:inkChg>
+        <pc:inkChg chg="add del mod">
+          <ac:chgData name="נועם ליבוביץ" userId="4c2341a7ea8aa887" providerId="LiveId" clId="{3D0969C5-1F15-4295-88FA-413B1D0F027D}" dt="2024-11-25T12:57:49.270" v="475"/>
+          <ac:inkMkLst>
+            <pc:docMk/>
+            <pc:sldMk cId="3331921883" sldId="258"/>
+            <ac:inkMk id="61" creationId="{BAB378C7-852B-6ACA-5E24-B99FC4C920EC}"/>
+          </ac:inkMkLst>
+        </pc:inkChg>
+        <pc:inkChg chg="add del mod">
+          <ac:chgData name="נועם ליבוביץ" userId="4c2341a7ea8aa887" providerId="LiveId" clId="{3D0969C5-1F15-4295-88FA-413B1D0F027D}" dt="2024-11-25T12:57:49.258" v="390"/>
+          <ac:inkMkLst>
+            <pc:docMk/>
+            <pc:sldMk cId="3331921883" sldId="258"/>
+            <ac:inkMk id="62" creationId="{B4D9DFC9-6B0E-F240-5624-DBA2F7E29DD9}"/>
+          </ac:inkMkLst>
+        </pc:inkChg>
+        <pc:inkChg chg="add del mod">
+          <ac:chgData name="נועם ליבוביץ" userId="4c2341a7ea8aa887" providerId="LiveId" clId="{3D0969C5-1F15-4295-88FA-413B1D0F027D}" dt="2024-11-25T12:57:49.268" v="469"/>
+          <ac:inkMkLst>
+            <pc:docMk/>
+            <pc:sldMk cId="3331921883" sldId="258"/>
+            <ac:inkMk id="63" creationId="{3E7849CF-9306-D2CD-2BEF-CAA63189FBC8}"/>
+          </ac:inkMkLst>
+        </pc:inkChg>
+        <pc:inkChg chg="add del mod">
+          <ac:chgData name="נועם ליבוביץ" userId="4c2341a7ea8aa887" providerId="LiveId" clId="{3D0969C5-1F15-4295-88FA-413B1D0F027D}" dt="2024-11-25T12:57:49.263" v="428"/>
+          <ac:inkMkLst>
+            <pc:docMk/>
+            <pc:sldMk cId="3331921883" sldId="258"/>
+            <ac:inkMk id="64" creationId="{4F2400A4-D38D-2D16-BC36-5B0BDF198351}"/>
+          </ac:inkMkLst>
+        </pc:inkChg>
+        <pc:inkChg chg="add del mod">
+          <ac:chgData name="נועם ליבוביץ" userId="4c2341a7ea8aa887" providerId="LiveId" clId="{3D0969C5-1F15-4295-88FA-413B1D0F027D}" dt="2024-11-25T12:57:49.264" v="437"/>
+          <ac:inkMkLst>
+            <pc:docMk/>
+            <pc:sldMk cId="3331921883" sldId="258"/>
+            <ac:inkMk id="65" creationId="{4C3D38BB-B99E-B615-72CA-D9B8E0DC6911}"/>
+          </ac:inkMkLst>
+        </pc:inkChg>
+        <pc:inkChg chg="add del mod">
+          <ac:chgData name="נועם ליבוביץ" userId="4c2341a7ea8aa887" providerId="LiveId" clId="{3D0969C5-1F15-4295-88FA-413B1D0F027D}" dt="2024-11-25T12:57:49.266" v="451"/>
+          <ac:inkMkLst>
+            <pc:docMk/>
+            <pc:sldMk cId="3331921883" sldId="258"/>
+            <ac:inkMk id="66" creationId="{B0E96A57-614B-7A04-ED31-5AD8549DFCC9}"/>
+          </ac:inkMkLst>
+        </pc:inkChg>
+        <pc:inkChg chg="add del mod">
+          <ac:chgData name="נועם ליבוביץ" userId="4c2341a7ea8aa887" providerId="LiveId" clId="{3D0969C5-1F15-4295-88FA-413B1D0F027D}" dt="2024-11-25T12:57:49.258" v="388"/>
+          <ac:inkMkLst>
+            <pc:docMk/>
+            <pc:sldMk cId="3331921883" sldId="258"/>
+            <ac:inkMk id="68" creationId="{4DF1DA03-2608-E429-ADE1-26AFCCE3D834}"/>
+          </ac:inkMkLst>
+        </pc:inkChg>
+        <pc:inkChg chg="add del mod">
+          <ac:chgData name="נועם ליבוביץ" userId="4c2341a7ea8aa887" providerId="LiveId" clId="{3D0969C5-1F15-4295-88FA-413B1D0F027D}" dt="2024-11-25T12:57:49.262" v="417"/>
+          <ac:inkMkLst>
+            <pc:docMk/>
+            <pc:sldMk cId="3331921883" sldId="258"/>
+            <ac:inkMk id="69" creationId="{65E91830-9D8F-70F5-75C6-38FD9DE41BA2}"/>
+          </ac:inkMkLst>
+        </pc:inkChg>
+        <pc:inkChg chg="add del mod">
+          <ac:chgData name="נועם ליבוביץ" userId="4c2341a7ea8aa887" providerId="LiveId" clId="{3D0969C5-1F15-4295-88FA-413B1D0F027D}" dt="2024-11-25T12:57:49.259" v="399"/>
+          <ac:inkMkLst>
+            <pc:docMk/>
+            <pc:sldMk cId="3331921883" sldId="258"/>
+            <ac:inkMk id="70" creationId="{533E8EED-6E8C-6198-9C70-5D44DBF47AD1}"/>
+          </ac:inkMkLst>
+        </pc:inkChg>
+        <pc:inkChg chg="add del mod">
+          <ac:chgData name="נועם ליבוביץ" userId="4c2341a7ea8aa887" providerId="LiveId" clId="{3D0969C5-1F15-4295-88FA-413B1D0F027D}" dt="2024-11-25T12:57:49.256" v="375"/>
+          <ac:inkMkLst>
+            <pc:docMk/>
+            <pc:sldMk cId="3331921883" sldId="258"/>
+            <ac:inkMk id="71" creationId="{76EFA5E4-DB2B-3155-8647-D8752C7B54DD}"/>
+          </ac:inkMkLst>
+        </pc:inkChg>
+        <pc:inkChg chg="add del mod">
+          <ac:chgData name="נועם ליבוביץ" userId="4c2341a7ea8aa887" providerId="LiveId" clId="{3D0969C5-1F15-4295-88FA-413B1D0F027D}" dt="2024-11-25T12:57:49.259" v="396"/>
+          <ac:inkMkLst>
+            <pc:docMk/>
+            <pc:sldMk cId="3331921883" sldId="258"/>
+            <ac:inkMk id="72" creationId="{BF2A5B7D-5FC8-B03F-A4D3-F0DBBC4BA740}"/>
+          </ac:inkMkLst>
+        </pc:inkChg>
+        <pc:inkChg chg="add del mod">
+          <ac:chgData name="נועם ליבוביץ" userId="4c2341a7ea8aa887" providerId="LiveId" clId="{3D0969C5-1F15-4295-88FA-413B1D0F027D}" dt="2024-11-25T12:57:49.270" v="472"/>
+          <ac:inkMkLst>
+            <pc:docMk/>
+            <pc:sldMk cId="3331921883" sldId="258"/>
+            <ac:inkMk id="73" creationId="{273D559F-EFAC-EBE1-BAD0-48CCA6107957}"/>
+          </ac:inkMkLst>
+        </pc:inkChg>
+        <pc:inkChg chg="add del mod">
+          <ac:chgData name="נועם ליבוביץ" userId="4c2341a7ea8aa887" providerId="LiveId" clId="{3D0969C5-1F15-4295-88FA-413B1D0F027D}" dt="2024-11-25T12:57:49.264" v="434"/>
+          <ac:inkMkLst>
+            <pc:docMk/>
+            <pc:sldMk cId="3331921883" sldId="258"/>
+            <ac:inkMk id="74" creationId="{F20966BA-0443-63DE-A789-AE32C34561D0}"/>
+          </ac:inkMkLst>
+        </pc:inkChg>
+        <pc:inkChg chg="add del">
+          <ac:chgData name="נועם ליבוביץ" userId="4c2341a7ea8aa887" providerId="LiveId" clId="{3D0969C5-1F15-4295-88FA-413B1D0F027D}" dt="2024-11-25T12:51:53.732" v="225"/>
+          <ac:inkMkLst>
+            <pc:docMk/>
+            <pc:sldMk cId="3331921883" sldId="258"/>
+            <ac:inkMk id="76" creationId="{C577B3CC-24BF-FABD-4B43-43C1FD609DBC}"/>
+          </ac:inkMkLst>
+        </pc:inkChg>
+        <pc:inkChg chg="add del">
+          <ac:chgData name="נועם ליבוביץ" userId="4c2341a7ea8aa887" providerId="LiveId" clId="{3D0969C5-1F15-4295-88FA-413B1D0F027D}" dt="2024-11-25T12:53:45.730" v="293"/>
+          <ac:inkMkLst>
+            <pc:docMk/>
+            <pc:sldMk cId="3331921883" sldId="258"/>
+            <ac:inkMk id="77" creationId="{F0455DDA-F70D-929E-AC1D-73DF144ACDCB}"/>
+          </ac:inkMkLst>
+        </pc:inkChg>
+        <pc:inkChg chg="add del mod">
+          <ac:chgData name="נועם ליבוביץ" userId="4c2341a7ea8aa887" providerId="LiveId" clId="{3D0969C5-1F15-4295-88FA-413B1D0F027D}" dt="2024-11-25T12:57:49.265" v="444"/>
+          <ac:inkMkLst>
+            <pc:docMk/>
+            <pc:sldMk cId="3331921883" sldId="258"/>
+            <ac:inkMk id="78" creationId="{523990BC-BF52-E111-2971-DFCDFB24DA4B}"/>
+          </ac:inkMkLst>
+        </pc:inkChg>
+        <pc:inkChg chg="add del mod">
+          <ac:chgData name="נועם ליבוביץ" userId="4c2341a7ea8aa887" providerId="LiveId" clId="{3D0969C5-1F15-4295-88FA-413B1D0F027D}" dt="2024-11-25T12:57:49.266" v="450"/>
+          <ac:inkMkLst>
+            <pc:docMk/>
+            <pc:sldMk cId="3331921883" sldId="258"/>
+            <ac:inkMk id="79" creationId="{D696E960-6684-EAB4-B258-36AA3D8A295F}"/>
+          </ac:inkMkLst>
+        </pc:inkChg>
+        <pc:inkChg chg="add del mod">
+          <ac:chgData name="נועם ליבוביץ" userId="4c2341a7ea8aa887" providerId="LiveId" clId="{3D0969C5-1F15-4295-88FA-413B1D0F027D}" dt="2024-11-25T12:57:49.256" v="378"/>
+          <ac:inkMkLst>
+            <pc:docMk/>
+            <pc:sldMk cId="3331921883" sldId="258"/>
+            <ac:inkMk id="80" creationId="{CF248742-DC1B-5972-E15B-A3DB511763AD}"/>
+          </ac:inkMkLst>
+        </pc:inkChg>
+        <pc:inkChg chg="add del mod">
+          <ac:chgData name="נועם ליבוביץ" userId="4c2341a7ea8aa887" providerId="LiveId" clId="{3D0969C5-1F15-4295-88FA-413B1D0F027D}" dt="2024-11-25T12:57:49.258" v="387"/>
+          <ac:inkMkLst>
+            <pc:docMk/>
+            <pc:sldMk cId="3331921883" sldId="258"/>
+            <ac:inkMk id="81" creationId="{7F54191C-5C2C-218F-CF6E-2F47BAF97441}"/>
+          </ac:inkMkLst>
+        </pc:inkChg>
+        <pc:inkChg chg="add del mod">
+          <ac:chgData name="נועם ליבוביץ" userId="4c2341a7ea8aa887" providerId="LiveId" clId="{3D0969C5-1F15-4295-88FA-413B1D0F027D}" dt="2024-11-25T12:57:49.263" v="429"/>
+          <ac:inkMkLst>
+            <pc:docMk/>
+            <pc:sldMk cId="3331921883" sldId="258"/>
+            <ac:inkMk id="82" creationId="{1E6E4E5B-0B68-B06F-7C5A-B583266262B8}"/>
+          </ac:inkMkLst>
+        </pc:inkChg>
+        <pc:inkChg chg="add del mod">
+          <ac:chgData name="נועם ליבוביץ" userId="4c2341a7ea8aa887" providerId="LiveId" clId="{3D0969C5-1F15-4295-88FA-413B1D0F027D}" dt="2024-11-25T12:57:49.257" v="382"/>
+          <ac:inkMkLst>
+            <pc:docMk/>
+            <pc:sldMk cId="3331921883" sldId="258"/>
+            <ac:inkMk id="83" creationId="{0F3F5C1B-E941-2C08-5005-67D5F3CCF35E}"/>
+          </ac:inkMkLst>
+        </pc:inkChg>
+        <pc:inkChg chg="add del mod">
+          <ac:chgData name="נועם ליבוביץ" userId="4c2341a7ea8aa887" providerId="LiveId" clId="{3D0969C5-1F15-4295-88FA-413B1D0F027D}" dt="2024-11-25T12:57:49.260" v="407"/>
+          <ac:inkMkLst>
+            <pc:docMk/>
+            <pc:sldMk cId="3331921883" sldId="258"/>
+            <ac:inkMk id="84" creationId="{3D53864C-FC38-E00F-B358-3FF64A840C2A}"/>
+          </ac:inkMkLst>
+        </pc:inkChg>
+        <pc:inkChg chg="add del mod">
+          <ac:chgData name="נועם ליבוביץ" userId="4c2341a7ea8aa887" providerId="LiveId" clId="{3D0969C5-1F15-4295-88FA-413B1D0F027D}" dt="2024-11-25T12:57:49.260" v="404"/>
+          <ac:inkMkLst>
+            <pc:docMk/>
+            <pc:sldMk cId="3331921883" sldId="258"/>
+            <ac:inkMk id="85" creationId="{AC16D839-D6F7-FE12-E399-82498944B367}"/>
+          </ac:inkMkLst>
+        </pc:inkChg>
+        <pc:inkChg chg="add del mod">
+          <ac:chgData name="נועם ליבוביץ" userId="4c2341a7ea8aa887" providerId="LiveId" clId="{3D0969C5-1F15-4295-88FA-413B1D0F027D}" dt="2024-11-25T12:57:49.268" v="459"/>
+          <ac:inkMkLst>
+            <pc:docMk/>
+            <pc:sldMk cId="3331921883" sldId="258"/>
+            <ac:inkMk id="87" creationId="{61134B5C-080F-8DAB-8BEA-5D466D57D829}"/>
+          </ac:inkMkLst>
+        </pc:inkChg>
+        <pc:inkChg chg="add del mod">
+          <ac:chgData name="נועם ליבוביץ" userId="4c2341a7ea8aa887" providerId="LiveId" clId="{3D0969C5-1F15-4295-88FA-413B1D0F027D}" dt="2024-11-25T12:57:49.264" v="438"/>
+          <ac:inkMkLst>
+            <pc:docMk/>
+            <pc:sldMk cId="3331921883" sldId="258"/>
+            <ac:inkMk id="88" creationId="{8FE49A0B-BCAA-A3AB-9F79-0277FD569CBD}"/>
+          </ac:inkMkLst>
+        </pc:inkChg>
+        <pc:inkChg chg="add del mod">
+          <ac:chgData name="נועם ליבוביץ" userId="4c2341a7ea8aa887" providerId="LiveId" clId="{3D0969C5-1F15-4295-88FA-413B1D0F027D}" dt="2024-11-25T12:57:49.254" v="367"/>
+          <ac:inkMkLst>
+            <pc:docMk/>
+            <pc:sldMk cId="3331921883" sldId="258"/>
+            <ac:inkMk id="89" creationId="{8B7EAB06-5CDF-0809-6DAC-82E96AA609B1}"/>
+          </ac:inkMkLst>
+        </pc:inkChg>
+        <pc:inkChg chg="add del mod">
+          <ac:chgData name="נועם ליבוביץ" userId="4c2341a7ea8aa887" providerId="LiveId" clId="{3D0969C5-1F15-4295-88FA-413B1D0F027D}" dt="2024-11-25T12:57:49.267" v="458"/>
+          <ac:inkMkLst>
+            <pc:docMk/>
+            <pc:sldMk cId="3331921883" sldId="258"/>
+            <ac:inkMk id="90" creationId="{EE2B09A3-A13A-5C49-5525-8EEBF0BFC570}"/>
+          </ac:inkMkLst>
+        </pc:inkChg>
+        <pc:inkChg chg="add del mod">
+          <ac:chgData name="נועם ליבוביץ" userId="4c2341a7ea8aa887" providerId="LiveId" clId="{3D0969C5-1F15-4295-88FA-413B1D0F027D}" dt="2024-11-25T12:57:49.257" v="384"/>
+          <ac:inkMkLst>
+            <pc:docMk/>
+            <pc:sldMk cId="3331921883" sldId="258"/>
+            <ac:inkMk id="91" creationId="{7663BFD2-A28D-EE5B-2459-ED5BC1F63678}"/>
+          </ac:inkMkLst>
+        </pc:inkChg>
+        <pc:inkChg chg="add del mod">
+          <ac:chgData name="נועם ליבוביץ" userId="4c2341a7ea8aa887" providerId="LiveId" clId="{3D0969C5-1F15-4295-88FA-413B1D0F027D}" dt="2024-11-25T12:57:49.254" v="366"/>
+          <ac:inkMkLst>
+            <pc:docMk/>
+            <pc:sldMk cId="3331921883" sldId="258"/>
+            <ac:inkMk id="92" creationId="{6C65DA73-5981-B3EA-E27B-3A1F03A95516}"/>
+          </ac:inkMkLst>
+        </pc:inkChg>
+        <pc:inkChg chg="add del mod">
+          <ac:chgData name="נועם ליבוביץ" userId="4c2341a7ea8aa887" providerId="LiveId" clId="{3D0969C5-1F15-4295-88FA-413B1D0F027D}" dt="2024-11-25T12:57:49.270" v="471"/>
+          <ac:inkMkLst>
+            <pc:docMk/>
+            <pc:sldMk cId="3331921883" sldId="258"/>
+            <ac:inkMk id="93" creationId="{2F9CADB7-8B38-C9D8-E392-E6F398DE180A}"/>
+          </ac:inkMkLst>
+        </pc:inkChg>
+        <pc:inkChg chg="add del mod">
+          <ac:chgData name="נועם ליבוביץ" userId="4c2341a7ea8aa887" providerId="LiveId" clId="{3D0969C5-1F15-4295-88FA-413B1D0F027D}" dt="2024-11-25T12:57:49.258" v="392"/>
+          <ac:inkMkLst>
+            <pc:docMk/>
+            <pc:sldMk cId="3331921883" sldId="258"/>
+            <ac:inkMk id="94" creationId="{355BC18E-CC71-97E0-BB3B-A555B83C6F51}"/>
+          </ac:inkMkLst>
+        </pc:inkChg>
+        <pc:inkChg chg="add del mod">
+          <ac:chgData name="נועם ליבוביץ" userId="4c2341a7ea8aa887" providerId="LiveId" clId="{3D0969C5-1F15-4295-88FA-413B1D0F027D}" dt="2024-11-25T12:57:49.263" v="424"/>
+          <ac:inkMkLst>
+            <pc:docMk/>
+            <pc:sldMk cId="3331921883" sldId="258"/>
+            <ac:inkMk id="95" creationId="{35AE952D-9F42-5496-28B8-C86762195D93}"/>
+          </ac:inkMkLst>
+        </pc:inkChg>
+        <pc:inkChg chg="add del mod">
+          <ac:chgData name="נועם ליבוביץ" userId="4c2341a7ea8aa887" providerId="LiveId" clId="{3D0969C5-1F15-4295-88FA-413B1D0F027D}" dt="2024-11-25T12:57:49.262" v="416"/>
+          <ac:inkMkLst>
+            <pc:docMk/>
+            <pc:sldMk cId="3331921883" sldId="258"/>
+            <ac:inkMk id="96" creationId="{402C9E39-6770-2CBF-EBD6-E909935F4CE2}"/>
+          </ac:inkMkLst>
+        </pc:inkChg>
+        <pc:inkChg chg="add del mod">
+          <ac:chgData name="נועם ליבוביץ" userId="4c2341a7ea8aa887" providerId="LiveId" clId="{3D0969C5-1F15-4295-88FA-413B1D0F027D}" dt="2024-11-25T12:57:49.266" v="448"/>
+          <ac:inkMkLst>
+            <pc:docMk/>
+            <pc:sldMk cId="3331921883" sldId="258"/>
+            <ac:inkMk id="97" creationId="{F4B95173-7D8C-B12C-F204-68C3EBFCF47E}"/>
+          </ac:inkMkLst>
+        </pc:inkChg>
+        <pc:inkChg chg="add del mod">
+          <ac:chgData name="נועם ליבוביץ" userId="4c2341a7ea8aa887" providerId="LiveId" clId="{3D0969C5-1F15-4295-88FA-413B1D0F027D}" dt="2024-11-25T12:57:49.260" v="402"/>
+          <ac:inkMkLst>
+            <pc:docMk/>
+            <pc:sldMk cId="3331921883" sldId="258"/>
+            <ac:inkMk id="100" creationId="{E4688EF4-E038-0F04-9D6D-0C92480B0D57}"/>
+          </ac:inkMkLst>
+        </pc:inkChg>
+        <pc:inkChg chg="add del mod">
+          <ac:chgData name="נועם ליבוביץ" userId="4c2341a7ea8aa887" providerId="LiveId" clId="{3D0969C5-1F15-4295-88FA-413B1D0F027D}" dt="2024-11-25T12:57:49.255" v="372"/>
+          <ac:inkMkLst>
+            <pc:docMk/>
+            <pc:sldMk cId="3331921883" sldId="258"/>
+            <ac:inkMk id="101" creationId="{0EDD6F09-4A18-2C8E-F7A2-D54ABEF32E25}"/>
+          </ac:inkMkLst>
+        </pc:inkChg>
+        <pc:inkChg chg="add del mod">
+          <ac:chgData name="נועם ליבוביץ" userId="4c2341a7ea8aa887" providerId="LiveId" clId="{3D0969C5-1F15-4295-88FA-413B1D0F027D}" dt="2024-11-25T12:57:49.267" v="454"/>
+          <ac:inkMkLst>
+            <pc:docMk/>
+            <pc:sldMk cId="3331921883" sldId="258"/>
+            <ac:inkMk id="102" creationId="{A47055DB-29A8-7841-CD22-DD5694BF7E68}"/>
+          </ac:inkMkLst>
+        </pc:inkChg>
+        <pc:inkChg chg="add del mod">
+          <ac:chgData name="נועם ליבוביץ" userId="4c2341a7ea8aa887" providerId="LiveId" clId="{3D0969C5-1F15-4295-88FA-413B1D0F027D}" dt="2024-11-25T12:57:49.261" v="414"/>
+          <ac:inkMkLst>
+            <pc:docMk/>
+            <pc:sldMk cId="3331921883" sldId="258"/>
+            <ac:inkMk id="103" creationId="{5BFAA8CE-8F61-BD18-9E95-D7B9602D3869}"/>
+          </ac:inkMkLst>
+        </pc:inkChg>
+        <pc:inkChg chg="add del mod">
+          <ac:chgData name="נועם ליבוביץ" userId="4c2341a7ea8aa887" providerId="LiveId" clId="{3D0969C5-1F15-4295-88FA-413B1D0F027D}" dt="2024-11-25T12:57:49.261" v="408"/>
+          <ac:inkMkLst>
+            <pc:docMk/>
+            <pc:sldMk cId="3331921883" sldId="258"/>
+            <ac:inkMk id="104" creationId="{601D3FF4-35C6-929B-D5ED-ED6890DD5CE2}"/>
+          </ac:inkMkLst>
+        </pc:inkChg>
+        <pc:inkChg chg="add del mod">
+          <ac:chgData name="נועם ליבוביץ" userId="4c2341a7ea8aa887" providerId="LiveId" clId="{3D0969C5-1F15-4295-88FA-413B1D0F027D}" dt="2024-11-25T12:57:49.260" v="401"/>
+          <ac:inkMkLst>
+            <pc:docMk/>
+            <pc:sldMk cId="3331921883" sldId="258"/>
+            <ac:inkMk id="105" creationId="{F4D004AB-5510-BE85-BAED-D0515BB98E9A}"/>
+          </ac:inkMkLst>
+        </pc:inkChg>
+        <pc:inkChg chg="add del mod">
+          <ac:chgData name="נועם ליבוביץ" userId="4c2341a7ea8aa887" providerId="LiveId" clId="{3D0969C5-1F15-4295-88FA-413B1D0F027D}" dt="2024-11-25T12:57:49.265" v="443"/>
+          <ac:inkMkLst>
+            <pc:docMk/>
+            <pc:sldMk cId="3331921883" sldId="258"/>
+            <ac:inkMk id="106" creationId="{ED60EE37-D359-0D03-B723-B16CAB1700D6}"/>
+          </ac:inkMkLst>
+        </pc:inkChg>
+        <pc:inkChg chg="add del mod">
+          <ac:chgData name="נועם ליבוביץ" userId="4c2341a7ea8aa887" providerId="LiveId" clId="{3D0969C5-1F15-4295-88FA-413B1D0F027D}" dt="2024-11-25T12:57:49.268" v="468"/>
+          <ac:inkMkLst>
+            <pc:docMk/>
+            <pc:sldMk cId="3331921883" sldId="258"/>
+            <ac:inkMk id="107" creationId="{184F1CEF-2D81-98C2-0606-4B8B726B2BB7}"/>
+          </ac:inkMkLst>
+        </pc:inkChg>
+        <pc:inkChg chg="add del mod">
+          <ac:chgData name="נועם ליבוביץ" userId="4c2341a7ea8aa887" providerId="LiveId" clId="{3D0969C5-1F15-4295-88FA-413B1D0F027D}" dt="2024-11-25T12:57:49.264" v="433"/>
+          <ac:inkMkLst>
+            <pc:docMk/>
+            <pc:sldMk cId="3331921883" sldId="258"/>
+            <ac:inkMk id="108" creationId="{BD7CDE86-7B91-C989-1FAA-FE39E89E4EFF}"/>
+          </ac:inkMkLst>
+        </pc:inkChg>
+        <pc:inkChg chg="add del mod">
+          <ac:chgData name="נועם ליבוביץ" userId="4c2341a7ea8aa887" providerId="LiveId" clId="{3D0969C5-1F15-4295-88FA-413B1D0F027D}" dt="2024-11-25T12:57:49.263" v="431"/>
+          <ac:inkMkLst>
+            <pc:docMk/>
+            <pc:sldMk cId="3331921883" sldId="258"/>
+            <ac:inkMk id="109" creationId="{0707111E-DCB5-01EE-E63D-4840D54987CE}"/>
+          </ac:inkMkLst>
+        </pc:inkChg>
+        <pc:inkChg chg="add del mod">
+          <ac:chgData name="נועם ליבוביץ" userId="4c2341a7ea8aa887" providerId="LiveId" clId="{3D0969C5-1F15-4295-88FA-413B1D0F027D}" dt="2024-11-25T12:57:49.264" v="436"/>
+          <ac:inkMkLst>
+            <pc:docMk/>
+            <pc:sldMk cId="3331921883" sldId="258"/>
+            <ac:inkMk id="110" creationId="{A73DC89A-DB5B-E9F6-444F-97B1DBBE4132}"/>
+          </ac:inkMkLst>
+        </pc:inkChg>
+        <pc:inkChg chg="add del mod">
+          <ac:chgData name="נועם ליבוביץ" userId="4c2341a7ea8aa887" providerId="LiveId" clId="{3D0969C5-1F15-4295-88FA-413B1D0F027D}" dt="2024-11-25T12:57:49.270" v="473"/>
+          <ac:inkMkLst>
+            <pc:docMk/>
+            <pc:sldMk cId="3331921883" sldId="258"/>
+            <ac:inkMk id="111" creationId="{DF7D9893-FA17-FA7D-CCC0-D1766D8633ED}"/>
+          </ac:inkMkLst>
+        </pc:inkChg>
+        <pc:inkChg chg="add del mod">
+          <ac:chgData name="נועם ליבוביץ" userId="4c2341a7ea8aa887" providerId="LiveId" clId="{3D0969C5-1F15-4295-88FA-413B1D0F027D}" dt="2024-11-25T12:57:49.261" v="410"/>
+          <ac:inkMkLst>
+            <pc:docMk/>
+            <pc:sldMk cId="3331921883" sldId="258"/>
+            <ac:inkMk id="114" creationId="{C9CBD26B-EA85-6C7C-85B9-73EDE743E7F1}"/>
+          </ac:inkMkLst>
+        </pc:inkChg>
+        <pc:inkChg chg="add del mod">
+          <ac:chgData name="נועם ליבוביץ" userId="4c2341a7ea8aa887" providerId="LiveId" clId="{3D0969C5-1F15-4295-88FA-413B1D0F027D}" dt="2024-11-25T12:57:49.265" v="441"/>
+          <ac:inkMkLst>
+            <pc:docMk/>
+            <pc:sldMk cId="3331921883" sldId="258"/>
+            <ac:inkMk id="115" creationId="{93B99274-1E4B-A751-9B24-818F0F96B7DB}"/>
+          </ac:inkMkLst>
+        </pc:inkChg>
+        <pc:inkChg chg="add del mod">
+          <ac:chgData name="נועם ליבוביץ" userId="4c2341a7ea8aa887" providerId="LiveId" clId="{3D0969C5-1F15-4295-88FA-413B1D0F027D}" dt="2024-11-25T12:57:49.264" v="440"/>
+          <ac:inkMkLst>
+            <pc:docMk/>
+            <pc:sldMk cId="3331921883" sldId="258"/>
+            <ac:inkMk id="116" creationId="{69AA7D2F-CE93-B99F-EBA6-B629B7B2BDD1}"/>
+          </ac:inkMkLst>
+        </pc:inkChg>
+        <pc:inkChg chg="add del mod">
+          <ac:chgData name="נועם ליבוביץ" userId="4c2341a7ea8aa887" providerId="LiveId" clId="{3D0969C5-1F15-4295-88FA-413B1D0F027D}" dt="2024-11-25T12:57:49.265" v="442"/>
+          <ac:inkMkLst>
+            <pc:docMk/>
+            <pc:sldMk cId="3331921883" sldId="258"/>
+            <ac:inkMk id="117" creationId="{B540BBAC-414B-89F2-E9B9-1174C80D4061}"/>
+          </ac:inkMkLst>
+        </pc:inkChg>
+        <pc:inkChg chg="add del mod">
+          <ac:chgData name="נועם ליבוביץ" userId="4c2341a7ea8aa887" providerId="LiveId" clId="{3D0969C5-1F15-4295-88FA-413B1D0F027D}" dt="2024-11-25T12:57:49.270" v="477"/>
+          <ac:inkMkLst>
+            <pc:docMk/>
+            <pc:sldMk cId="3331921883" sldId="258"/>
+            <ac:inkMk id="119" creationId="{371B321A-26FF-D3BE-AE66-080E8CCD783B}"/>
+          </ac:inkMkLst>
+        </pc:inkChg>
+        <pc:inkChg chg="add del mod">
+          <ac:chgData name="נועם ליבוביץ" userId="4c2341a7ea8aa887" providerId="LiveId" clId="{3D0969C5-1F15-4295-88FA-413B1D0F027D}" dt="2024-11-25T12:57:49.260" v="405"/>
+          <ac:inkMkLst>
+            <pc:docMk/>
+            <pc:sldMk cId="3331921883" sldId="258"/>
+            <ac:inkMk id="120" creationId="{9DF3CA15-9A61-C02C-622B-627315FE7ED2}"/>
+          </ac:inkMkLst>
+        </pc:inkChg>
+        <pc:inkChg chg="add del mod">
+          <ac:chgData name="נועם ליבוביץ" userId="4c2341a7ea8aa887" providerId="LiveId" clId="{3D0969C5-1F15-4295-88FA-413B1D0F027D}" dt="2024-11-25T12:57:49.254" v="365"/>
+          <ac:inkMkLst>
+            <pc:docMk/>
+            <pc:sldMk cId="3331921883" sldId="258"/>
+            <ac:inkMk id="121" creationId="{BDA9A5EF-9684-D444-8981-B5FB784E96A5}"/>
+          </ac:inkMkLst>
+        </pc:inkChg>
+        <pc:inkChg chg="add del mod">
+          <ac:chgData name="נועם ליבוביץ" userId="4c2341a7ea8aa887" providerId="LiveId" clId="{3D0969C5-1F15-4295-88FA-413B1D0F027D}" dt="2024-11-25T12:57:49.257" v="383"/>
+          <ac:inkMkLst>
+            <pc:docMk/>
+            <pc:sldMk cId="3331921883" sldId="258"/>
+            <ac:inkMk id="122" creationId="{05C8346B-BB71-18FE-245A-5843D75AFCEA}"/>
+          </ac:inkMkLst>
+        </pc:inkChg>
+        <pc:inkChg chg="add del mod">
+          <ac:chgData name="נועם ליבוביץ" userId="4c2341a7ea8aa887" providerId="LiveId" clId="{3D0969C5-1F15-4295-88FA-413B1D0F027D}" dt="2024-11-25T12:57:49.267" v="452"/>
+          <ac:inkMkLst>
+            <pc:docMk/>
+            <pc:sldMk cId="3331921883" sldId="258"/>
+            <ac:inkMk id="123" creationId="{C03A9E80-AE4B-099C-C37B-A924D694BFC0}"/>
+          </ac:inkMkLst>
+        </pc:inkChg>
+        <pc:inkChg chg="add del mod">
+          <ac:chgData name="נועם ליבוביץ" userId="4c2341a7ea8aa887" providerId="LiveId" clId="{3D0969C5-1F15-4295-88FA-413B1D0F027D}" dt="2024-11-25T12:57:49.255" v="369"/>
+          <ac:inkMkLst>
+            <pc:docMk/>
+            <pc:sldMk cId="3331921883" sldId="258"/>
+            <ac:inkMk id="124" creationId="{A23731A6-66F5-D6D1-5832-27D8A19163CB}"/>
+          </ac:inkMkLst>
+        </pc:inkChg>
+        <pc:inkChg chg="add del mod">
+          <ac:chgData name="נועם ליבוביץ" userId="4c2341a7ea8aa887" providerId="LiveId" clId="{3D0969C5-1F15-4295-88FA-413B1D0F027D}" dt="2024-11-25T12:57:49.261" v="412"/>
+          <ac:inkMkLst>
+            <pc:docMk/>
+            <pc:sldMk cId="3331921883" sldId="258"/>
+            <ac:inkMk id="126" creationId="{181330F7-0E56-1C28-E49A-722BC96FA844}"/>
+          </ac:inkMkLst>
+        </pc:inkChg>
+        <pc:inkChg chg="add del mod">
+          <ac:chgData name="נועם ליבוביץ" userId="4c2341a7ea8aa887" providerId="LiveId" clId="{3D0969C5-1F15-4295-88FA-413B1D0F027D}" dt="2024-11-25T12:57:49.259" v="397"/>
+          <ac:inkMkLst>
+            <pc:docMk/>
+            <pc:sldMk cId="3331921883" sldId="258"/>
+            <ac:inkMk id="127" creationId="{877224EE-A437-7132-444E-6EECF7ED7821}"/>
+          </ac:inkMkLst>
+        </pc:inkChg>
+        <pc:inkChg chg="add del mod">
+          <ac:chgData name="נועם ליבוביץ" userId="4c2341a7ea8aa887" providerId="LiveId" clId="{3D0969C5-1F15-4295-88FA-413B1D0F027D}" dt="2024-11-25T12:57:49.259" v="394"/>
+          <ac:inkMkLst>
+            <pc:docMk/>
+            <pc:sldMk cId="3331921883" sldId="258"/>
+            <ac:inkMk id="128" creationId="{99033C7D-037F-C147-3D80-AC0296307476}"/>
+          </ac:inkMkLst>
+        </pc:inkChg>
+        <pc:inkChg chg="add del mod">
+          <ac:chgData name="נועם ליבוביץ" userId="4c2341a7ea8aa887" providerId="LiveId" clId="{3D0969C5-1F15-4295-88FA-413B1D0F027D}" dt="2024-11-25T12:57:49.264" v="435"/>
+          <ac:inkMkLst>
+            <pc:docMk/>
+            <pc:sldMk cId="3331921883" sldId="258"/>
+            <ac:inkMk id="129" creationId="{1DC068B0-CA11-136A-E2A5-7BB7C5D7D9C6}"/>
+          </ac:inkMkLst>
+        </pc:inkChg>
+        <pc:inkChg chg="add del mod">
+          <ac:chgData name="נועם ליבוביץ" userId="4c2341a7ea8aa887" providerId="LiveId" clId="{3D0969C5-1F15-4295-88FA-413B1D0F027D}" dt="2024-11-25T12:57:49.262" v="422"/>
+          <ac:inkMkLst>
+            <pc:docMk/>
+            <pc:sldMk cId="3331921883" sldId="258"/>
+            <ac:inkMk id="130" creationId="{F825243A-F62E-898E-C527-E26A60DE3046}"/>
+          </ac:inkMkLst>
+        </pc:inkChg>
+        <pc:inkChg chg="add del mod">
+          <ac:chgData name="נועם ליבוביץ" userId="4c2341a7ea8aa887" providerId="LiveId" clId="{3D0969C5-1F15-4295-88FA-413B1D0F027D}" dt="2024-11-25T12:57:49.259" v="398"/>
+          <ac:inkMkLst>
+            <pc:docMk/>
+            <pc:sldMk cId="3331921883" sldId="258"/>
+            <ac:inkMk id="132" creationId="{C9E88CD7-6DFD-352C-97F9-1C73489B76AB}"/>
+          </ac:inkMkLst>
+        </pc:inkChg>
+        <pc:inkChg chg="add del mod">
+          <ac:chgData name="נועם ליבוביץ" userId="4c2341a7ea8aa887" providerId="LiveId" clId="{3D0969C5-1F15-4295-88FA-413B1D0F027D}" dt="2024-11-25T12:57:49.268" v="464"/>
+          <ac:inkMkLst>
+            <pc:docMk/>
+            <pc:sldMk cId="3331921883" sldId="258"/>
+            <ac:inkMk id="134" creationId="{C3F5F5D1-3E04-16D2-C236-7CB89F0ED6E1}"/>
+          </ac:inkMkLst>
+        </pc:inkChg>
+        <pc:inkChg chg="add del mod">
+          <ac:chgData name="נועם ליבוביץ" userId="4c2341a7ea8aa887" providerId="LiveId" clId="{3D0969C5-1F15-4295-88FA-413B1D0F027D}" dt="2024-11-25T12:57:49.268" v="461"/>
+          <ac:inkMkLst>
+            <pc:docMk/>
+            <pc:sldMk cId="3331921883" sldId="258"/>
+            <ac:inkMk id="135" creationId="{AC443291-593D-C4A6-83B4-4D93621CE11A}"/>
+          </ac:inkMkLst>
+        </pc:inkChg>
+        <pc:inkChg chg="add del mod">
+          <ac:chgData name="נועם ליבוביץ" userId="4c2341a7ea8aa887" providerId="LiveId" clId="{3D0969C5-1F15-4295-88FA-413B1D0F027D}" dt="2024-11-25T12:57:49.263" v="426"/>
+          <ac:inkMkLst>
+            <pc:docMk/>
+            <pc:sldMk cId="3331921883" sldId="258"/>
+            <ac:inkMk id="136" creationId="{60926FCC-9E43-D769-F8D4-DAF681A23A68}"/>
+          </ac:inkMkLst>
+        </pc:inkChg>
+        <pc:inkChg chg="add del mod">
+          <ac:chgData name="נועם ליבוביץ" userId="4c2341a7ea8aa887" providerId="LiveId" clId="{3D0969C5-1F15-4295-88FA-413B1D0F027D}" dt="2024-11-25T12:57:49.257" v="381"/>
+          <ac:inkMkLst>
+            <pc:docMk/>
+            <pc:sldMk cId="3331921883" sldId="258"/>
+            <ac:inkMk id="137" creationId="{B43D54DE-3128-A13B-548C-7FA6CAEB37AC}"/>
+          </ac:inkMkLst>
+        </pc:inkChg>
+        <pc:inkChg chg="add del mod">
+          <ac:chgData name="נועם ליבוביץ" userId="4c2341a7ea8aa887" providerId="LiveId" clId="{3D0969C5-1F15-4295-88FA-413B1D0F027D}" dt="2024-11-25T12:57:49.260" v="406"/>
+          <ac:inkMkLst>
+            <pc:docMk/>
+            <pc:sldMk cId="3331921883" sldId="258"/>
+            <ac:inkMk id="138" creationId="{C16E9E11-0105-268C-519D-85CABACFD1F4}"/>
+          </ac:inkMkLst>
+        </pc:inkChg>
+        <pc:inkChg chg="add del mod">
+          <ac:chgData name="נועם ליבוביץ" userId="4c2341a7ea8aa887" providerId="LiveId" clId="{3D0969C5-1F15-4295-88FA-413B1D0F027D}" dt="2024-11-25T12:57:49.255" v="370"/>
+          <ac:inkMkLst>
+            <pc:docMk/>
+            <pc:sldMk cId="3331921883" sldId="258"/>
+            <ac:inkMk id="140" creationId="{046AF9D7-9761-9F4E-C30E-9382CA8714D1}"/>
+          </ac:inkMkLst>
+        </pc:inkChg>
+        <pc:inkChg chg="add del mod">
+          <ac:chgData name="נועם ליבוביץ" userId="4c2341a7ea8aa887" providerId="LiveId" clId="{3D0969C5-1F15-4295-88FA-413B1D0F027D}" dt="2024-11-25T12:57:49.262" v="418"/>
+          <ac:inkMkLst>
+            <pc:docMk/>
+            <pc:sldMk cId="3331921883" sldId="258"/>
+            <ac:inkMk id="141" creationId="{85B2D78D-4C17-4D9D-72B0-7C662583DE61}"/>
+          </ac:inkMkLst>
+        </pc:inkChg>
+        <pc:inkChg chg="add del mod">
+          <ac:chgData name="נועם ליבוביץ" userId="4c2341a7ea8aa887" providerId="LiveId" clId="{3D0969C5-1F15-4295-88FA-413B1D0F027D}" dt="2024-11-25T12:57:49.268" v="467"/>
+          <ac:inkMkLst>
+            <pc:docMk/>
+            <pc:sldMk cId="3331921883" sldId="258"/>
+            <ac:inkMk id="143" creationId="{D4752BAF-66C6-AA5E-DAB6-110DF6763062}"/>
+          </ac:inkMkLst>
+        </pc:inkChg>
+        <pc:inkChg chg="add del mod">
+          <ac:chgData name="נועם ליבוביץ" userId="4c2341a7ea8aa887" providerId="LiveId" clId="{3D0969C5-1F15-4295-88FA-413B1D0F027D}" dt="2024-11-25T12:57:49.267" v="455"/>
+          <ac:inkMkLst>
+            <pc:docMk/>
+            <pc:sldMk cId="3331921883" sldId="258"/>
+            <ac:inkMk id="145" creationId="{2E3D1CA2-C465-00B8-91F4-979E0B6EB688}"/>
+          </ac:inkMkLst>
+        </pc:inkChg>
+        <pc:inkChg chg="add del mod">
+          <ac:chgData name="נועם ליבוביץ" userId="4c2341a7ea8aa887" providerId="LiveId" clId="{3D0969C5-1F15-4295-88FA-413B1D0F027D}" dt="2024-11-25T12:54:05.898" v="301"/>
+          <ac:inkMkLst>
+            <pc:docMk/>
+            <pc:sldMk cId="3331921883" sldId="258"/>
+            <ac:inkMk id="147" creationId="{84624DB4-5127-4429-FB5E-DC758F43360E}"/>
+          </ac:inkMkLst>
+        </pc:inkChg>
+        <pc:inkChg chg="add del">
+          <ac:chgData name="נועם ליבוביץ" userId="4c2341a7ea8aa887" providerId="LiveId" clId="{3D0969C5-1F15-4295-88FA-413B1D0F027D}" dt="2024-11-25T12:57:49.261" v="409"/>
+          <ac:inkMkLst>
+            <pc:docMk/>
+            <pc:sldMk cId="3331921883" sldId="258"/>
+            <ac:inkMk id="149" creationId="{3572D9D3-A394-DBD9-1F7C-662A9FB5C96F}"/>
+          </ac:inkMkLst>
+        </pc:inkChg>
+        <pc:inkChg chg="add del mod">
+          <ac:chgData name="נועם ליבוביץ" userId="4c2341a7ea8aa887" providerId="LiveId" clId="{3D0969C5-1F15-4295-88FA-413B1D0F027D}" dt="2024-11-25T12:54:32.128" v="308" actId="9405"/>
+          <ac:inkMkLst>
+            <pc:docMk/>
+            <pc:sldMk cId="3331921883" sldId="258"/>
+            <ac:inkMk id="150" creationId="{E71B5601-ABAB-93C0-35F2-405D78222E5B}"/>
+          </ac:inkMkLst>
+        </pc:inkChg>
+        <pc:inkChg chg="add del mod">
+          <ac:chgData name="נועם ליבוביץ" userId="4c2341a7ea8aa887" providerId="LiveId" clId="{3D0969C5-1F15-4295-88FA-413B1D0F027D}" dt="2024-11-25T12:54:30.825" v="307"/>
+          <ac:inkMkLst>
+            <pc:docMk/>
+            <pc:sldMk cId="3331921883" sldId="258"/>
+            <ac:inkMk id="151" creationId="{555D437C-4BAC-C768-058E-67681F7A736C}"/>
+          </ac:inkMkLst>
+        </pc:inkChg>
+        <pc:inkChg chg="add del">
+          <ac:chgData name="נועם ליבוביץ" userId="4c2341a7ea8aa887" providerId="LiveId" clId="{3D0969C5-1F15-4295-88FA-413B1D0F027D}" dt="2024-11-25T12:54:35.102" v="310" actId="9405"/>
+          <ac:inkMkLst>
+            <pc:docMk/>
+            <pc:sldMk cId="3331921883" sldId="258"/>
+            <ac:inkMk id="153" creationId="{2F3CE42D-2B34-F03B-31CB-D53A1E2AC8D2}"/>
+          </ac:inkMkLst>
+        </pc:inkChg>
+        <pc:inkChg chg="add del">
+          <ac:chgData name="נועם ליבוביץ" userId="4c2341a7ea8aa887" providerId="LiveId" clId="{3D0969C5-1F15-4295-88FA-413B1D0F027D}" dt="2024-11-25T12:57:49.261" v="415"/>
+          <ac:inkMkLst>
+            <pc:docMk/>
+            <pc:sldMk cId="3331921883" sldId="258"/>
+            <ac:inkMk id="154" creationId="{62138C8C-1390-47C8-B9FE-65BC7317A481}"/>
+          </ac:inkMkLst>
+        </pc:inkChg>
+        <pc:inkChg chg="add del">
+          <ac:chgData name="נועם ליבוביץ" userId="4c2341a7ea8aa887" providerId="LiveId" clId="{3D0969C5-1F15-4295-88FA-413B1D0F027D}" dt="2024-11-25T12:54:50.417" v="313" actId="9405"/>
+          <ac:inkMkLst>
+            <pc:docMk/>
+            <pc:sldMk cId="3331921883" sldId="258"/>
+            <ac:inkMk id="155" creationId="{DED9D1AA-4F95-48E1-BCD6-BABD74B1F204}"/>
+          </ac:inkMkLst>
+        </pc:inkChg>
+        <pc:inkChg chg="add del">
+          <ac:chgData name="נועם ליבוביץ" userId="4c2341a7ea8aa887" providerId="LiveId" clId="{3D0969C5-1F15-4295-88FA-413B1D0F027D}" dt="2024-11-25T12:54:57.460" v="317" actId="9405"/>
+          <ac:inkMkLst>
+            <pc:docMk/>
+            <pc:sldMk cId="3331921883" sldId="258"/>
+            <ac:inkMk id="156" creationId="{A06F4CD1-3A4B-8E8C-5ADA-859FEA09F33C}"/>
+          </ac:inkMkLst>
+        </pc:inkChg>
+        <pc:inkChg chg="add">
+          <ac:chgData name="נועם ליבוביץ" userId="4c2341a7ea8aa887" providerId="LiveId" clId="{3D0969C5-1F15-4295-88FA-413B1D0F027D}" dt="2024-11-25T12:54:53.940" v="315"/>
+          <ac:inkMkLst>
+            <pc:docMk/>
+            <pc:sldMk cId="3331921883" sldId="258"/>
+            <ac:inkMk id="157" creationId="{B00C4EB9-B4D5-881F-C7FE-A818CBEDBC4B}"/>
+          </ac:inkMkLst>
+        </pc:inkChg>
+        <pc:inkChg chg="add del mod">
+          <ac:chgData name="נועם ליבוביץ" userId="4c2341a7ea8aa887" providerId="LiveId" clId="{3D0969C5-1F15-4295-88FA-413B1D0F027D}" dt="2024-11-25T12:57:49.267" v="457"/>
+          <ac:inkMkLst>
+            <pc:docMk/>
+            <pc:sldMk cId="3331921883" sldId="258"/>
+            <ac:inkMk id="158" creationId="{9C66AFCB-BB7D-352A-F311-121ED7758E0E}"/>
+          </ac:inkMkLst>
+        </pc:inkChg>
+        <pc:inkChg chg="add del mod">
+          <ac:chgData name="נועם ליבוביץ" userId="4c2341a7ea8aa887" providerId="LiveId" clId="{3D0969C5-1F15-4295-88FA-413B1D0F027D}" dt="2024-11-25T12:57:49.255" v="373"/>
+          <ac:inkMkLst>
+            <pc:docMk/>
+            <pc:sldMk cId="3331921883" sldId="258"/>
+            <ac:inkMk id="159" creationId="{2B2333DD-7E97-4A01-8A0A-2B2071A563D7}"/>
+          </ac:inkMkLst>
+        </pc:inkChg>
+        <pc:inkChg chg="add del mod">
+          <ac:chgData name="נועם ליבוביץ" userId="4c2341a7ea8aa887" providerId="LiveId" clId="{3D0969C5-1F15-4295-88FA-413B1D0F027D}" dt="2024-11-25T12:57:49.268" v="460"/>
+          <ac:inkMkLst>
+            <pc:docMk/>
+            <pc:sldMk cId="3331921883" sldId="258"/>
+            <ac:inkMk id="160" creationId="{DBCBE93D-C3E2-6B5B-E616-15FB00988FCB}"/>
+          </ac:inkMkLst>
+        </pc:inkChg>
+        <pc:inkChg chg="add del mod">
+          <ac:chgData name="נועם ליבוביץ" userId="4c2341a7ea8aa887" providerId="LiveId" clId="{3D0969C5-1F15-4295-88FA-413B1D0F027D}" dt="2024-11-25T12:57:49.255" v="371"/>
+          <ac:inkMkLst>
+            <pc:docMk/>
+            <pc:sldMk cId="3331921883" sldId="258"/>
+            <ac:inkMk id="161" creationId="{059A68CA-697F-08BA-B02D-B491E8736808}"/>
+          </ac:inkMkLst>
+        </pc:inkChg>
+        <pc:inkChg chg="add del mod">
+          <ac:chgData name="נועם ליבוביץ" userId="4c2341a7ea8aa887" providerId="LiveId" clId="{3D0969C5-1F15-4295-88FA-413B1D0F027D}" dt="2024-11-25T12:57:49.268" v="463"/>
+          <ac:inkMkLst>
+            <pc:docMk/>
+            <pc:sldMk cId="3331921883" sldId="258"/>
+            <ac:inkMk id="163" creationId="{B468EA90-C715-DF8F-46E8-949368D553A0}"/>
+          </ac:inkMkLst>
+        </pc:inkChg>
+        <pc:inkChg chg="add del mod">
+          <ac:chgData name="נועם ליבוביץ" userId="4c2341a7ea8aa887" providerId="LiveId" clId="{3D0969C5-1F15-4295-88FA-413B1D0F027D}" dt="2024-11-25T12:57:49.258" v="393"/>
+          <ac:inkMkLst>
+            <pc:docMk/>
+            <pc:sldMk cId="3331921883" sldId="258"/>
+            <ac:inkMk id="164" creationId="{E6DD514B-075C-6328-9653-C15FE035C775}"/>
+          </ac:inkMkLst>
+        </pc:inkChg>
+        <pc:inkChg chg="add del mod">
+          <ac:chgData name="נועם ליבוביץ" userId="4c2341a7ea8aa887" providerId="LiveId" clId="{3D0969C5-1F15-4295-88FA-413B1D0F027D}" dt="2024-11-25T12:55:27.816" v="328"/>
+          <ac:inkMkLst>
+            <pc:docMk/>
+            <pc:sldMk cId="3331921883" sldId="258"/>
+            <ac:inkMk id="165" creationId="{DE53F05C-9193-FD9E-172A-89CE6F337ED6}"/>
+          </ac:inkMkLst>
+        </pc:inkChg>
+        <pc:inkChg chg="add del mod">
+          <ac:chgData name="נועם ליבוביץ" userId="4c2341a7ea8aa887" providerId="LiveId" clId="{3D0969C5-1F15-4295-88FA-413B1D0F027D}" dt="2024-11-25T12:55:27.817" v="329"/>
+          <ac:inkMkLst>
+            <pc:docMk/>
+            <pc:sldMk cId="3331921883" sldId="258"/>
+            <ac:inkMk id="166" creationId="{1D730B06-B600-5DED-D428-8ABBCBA7FBBA}"/>
+          </ac:inkMkLst>
+        </pc:inkChg>
+        <pc:inkChg chg="add del mod">
+          <ac:chgData name="נועם ליבוביץ" userId="4c2341a7ea8aa887" providerId="LiveId" clId="{3D0969C5-1F15-4295-88FA-413B1D0F027D}" dt="2024-11-25T12:57:49.259" v="395"/>
+          <ac:inkMkLst>
+            <pc:docMk/>
+            <pc:sldMk cId="3331921883" sldId="258"/>
+            <ac:inkMk id="168" creationId="{37BDEF3F-E0C9-D3D0-72CF-B905F9580D01}"/>
+          </ac:inkMkLst>
+        </pc:inkChg>
+        <pc:inkChg chg="add del mod">
+          <ac:chgData name="נועם ליבוביץ" userId="4c2341a7ea8aa887" providerId="LiveId" clId="{3D0969C5-1F15-4295-88FA-413B1D0F027D}" dt="2024-11-25T12:57:49.256" v="377"/>
+          <ac:inkMkLst>
+            <pc:docMk/>
+            <pc:sldMk cId="3331921883" sldId="258"/>
+            <ac:inkMk id="169" creationId="{6C515A73-BFDF-986E-1588-D8F1BA5E9B49}"/>
+          </ac:inkMkLst>
+        </pc:inkChg>
+        <pc:inkChg chg="add del mod">
+          <ac:chgData name="נועם ליבוביץ" userId="4c2341a7ea8aa887" providerId="LiveId" clId="{3D0969C5-1F15-4295-88FA-413B1D0F027D}" dt="2024-11-25T12:57:49.256" v="379"/>
+          <ac:inkMkLst>
+            <pc:docMk/>
+            <pc:sldMk cId="3331921883" sldId="258"/>
+            <ac:inkMk id="170" creationId="{411404FA-1E9E-905A-D8DA-014853FDD199}"/>
+          </ac:inkMkLst>
+        </pc:inkChg>
+        <pc:inkChg chg="add del mod">
+          <ac:chgData name="נועם ליבוביץ" userId="4c2341a7ea8aa887" providerId="LiveId" clId="{3D0969C5-1F15-4295-88FA-413B1D0F027D}" dt="2024-11-25T12:57:49.263" v="425"/>
+          <ac:inkMkLst>
+            <pc:docMk/>
+            <pc:sldMk cId="3331921883" sldId="258"/>
+            <ac:inkMk id="171" creationId="{36CF552C-73E1-0D6F-FB5B-2773ED2617B7}"/>
+          </ac:inkMkLst>
+        </pc:inkChg>
+        <pc:inkChg chg="add del mod">
+          <ac:chgData name="נועם ליבוביץ" userId="4c2341a7ea8aa887" providerId="LiveId" clId="{3D0969C5-1F15-4295-88FA-413B1D0F027D}" dt="2024-11-25T12:57:49.262" v="421"/>
+          <ac:inkMkLst>
+            <pc:docMk/>
+            <pc:sldMk cId="3331921883" sldId="258"/>
+            <ac:inkMk id="172" creationId="{ECD7865A-0597-F193-ED1A-950CB3C8B743}"/>
+          </ac:inkMkLst>
+        </pc:inkChg>
+        <pc:inkChg chg="add del mod">
+          <ac:chgData name="נועם ליבוביץ" userId="4c2341a7ea8aa887" providerId="LiveId" clId="{3D0969C5-1F15-4295-88FA-413B1D0F027D}" dt="2024-11-25T12:57:49.259" v="400"/>
+          <ac:inkMkLst>
+            <pc:docMk/>
+            <pc:sldMk cId="3331921883" sldId="258"/>
+            <ac:inkMk id="173" creationId="{CB9957F1-46F9-787F-8CC8-C0B5B778C318}"/>
+          </ac:inkMkLst>
+        </pc:inkChg>
+        <pc:inkChg chg="add del mod">
+          <ac:chgData name="נועם ליבוביץ" userId="4c2341a7ea8aa887" providerId="LiveId" clId="{3D0969C5-1F15-4295-88FA-413B1D0F027D}" dt="2024-11-25T12:57:49.264" v="439"/>
+          <ac:inkMkLst>
+            <pc:docMk/>
+            <pc:sldMk cId="3331921883" sldId="258"/>
+            <ac:inkMk id="174" creationId="{386FCD0F-8AD5-E9D4-0965-109238F2D85D}"/>
+          </ac:inkMkLst>
+        </pc:inkChg>
+        <pc:inkChg chg="add del mod">
+          <ac:chgData name="נועם ליבוביץ" userId="4c2341a7ea8aa887" providerId="LiveId" clId="{3D0969C5-1F15-4295-88FA-413B1D0F027D}" dt="2024-11-25T12:57:49.268" v="466"/>
+          <ac:inkMkLst>
+            <pc:docMk/>
+            <pc:sldMk cId="3331921883" sldId="258"/>
+            <ac:inkMk id="175" creationId="{C00C650E-B5F1-9432-A248-C8063AB5D117}"/>
+          </ac:inkMkLst>
+        </pc:inkChg>
+        <pc:inkChg chg="add del mod">
+          <ac:chgData name="נועם ליבוביץ" userId="4c2341a7ea8aa887" providerId="LiveId" clId="{3D0969C5-1F15-4295-88FA-413B1D0F027D}" dt="2024-11-25T12:57:49.268" v="465"/>
+          <ac:inkMkLst>
+            <pc:docMk/>
+            <pc:sldMk cId="3331921883" sldId="258"/>
+            <ac:inkMk id="176" creationId="{73FFF8F5-68B4-C427-A08A-1830EC4D5F64}"/>
+          </ac:inkMkLst>
+        </pc:inkChg>
+        <pc:inkChg chg="add del">
+          <ac:chgData name="נועם ליבוביץ" userId="4c2341a7ea8aa887" providerId="LiveId" clId="{3D0969C5-1F15-4295-88FA-413B1D0F027D}" dt="2024-11-25T12:57:49.256" v="376"/>
+          <ac:inkMkLst>
+            <pc:docMk/>
+            <pc:sldMk cId="3331921883" sldId="258"/>
+            <ac:inkMk id="179" creationId="{0D31D850-7521-FB8C-DB87-F0BCDDB30FE8}"/>
+          </ac:inkMkLst>
+        </pc:inkChg>
+        <pc:inkChg chg="add del mod">
+          <ac:chgData name="נועם ליבוביץ" userId="4c2341a7ea8aa887" providerId="LiveId" clId="{3D0969C5-1F15-4295-88FA-413B1D0F027D}" dt="2024-11-25T12:57:49.263" v="430"/>
+          <ac:inkMkLst>
+            <pc:docMk/>
+            <pc:sldMk cId="3331921883" sldId="258"/>
+            <ac:inkMk id="180" creationId="{0E2BA8CB-F656-A4FE-69A1-2179C02F05BA}"/>
+          </ac:inkMkLst>
+        </pc:inkChg>
+        <pc:inkChg chg="add del mod">
+          <ac:chgData name="נועם ליבוביץ" userId="4c2341a7ea8aa887" providerId="LiveId" clId="{3D0969C5-1F15-4295-88FA-413B1D0F027D}" dt="2024-11-25T12:57:49.267" v="456"/>
+          <ac:inkMkLst>
+            <pc:docMk/>
+            <pc:sldMk cId="3331921883" sldId="258"/>
+            <ac:inkMk id="182" creationId="{A231BFCA-98F0-76D5-AC0A-FFC7C9AC165E}"/>
+          </ac:inkMkLst>
+        </pc:inkChg>
+        <pc:inkChg chg="add del mod">
+          <ac:chgData name="נועם ליבוביץ" userId="4c2341a7ea8aa887" providerId="LiveId" clId="{3D0969C5-1F15-4295-88FA-413B1D0F027D}" dt="2024-11-25T12:57:49.262" v="423"/>
+          <ac:inkMkLst>
+            <pc:docMk/>
+            <pc:sldMk cId="3331921883" sldId="258"/>
+            <ac:inkMk id="183" creationId="{CCF7A918-C75F-14EE-C3EF-4DEDE695A2C8}"/>
+          </ac:inkMkLst>
+        </pc:inkChg>
+        <pc:inkChg chg="add del mod">
+          <ac:chgData name="נועם ליבוביץ" userId="4c2341a7ea8aa887" providerId="LiveId" clId="{3D0969C5-1F15-4295-88FA-413B1D0F027D}" dt="2024-11-25T12:57:49.258" v="391"/>
+          <ac:inkMkLst>
+            <pc:docMk/>
+            <pc:sldMk cId="3331921883" sldId="258"/>
+            <ac:inkMk id="184" creationId="{DB4D4778-1E82-38E2-5B3B-E93B4CEAAA45}"/>
+          </ac:inkMkLst>
+        </pc:inkChg>
+        <pc:inkChg chg="add del mod">
+          <ac:chgData name="נועם ליבוביץ" userId="4c2341a7ea8aa887" providerId="LiveId" clId="{3D0969C5-1F15-4295-88FA-413B1D0F027D}" dt="2024-11-25T12:57:49.261" v="413"/>
+          <ac:inkMkLst>
+            <pc:docMk/>
+            <pc:sldMk cId="3331921883" sldId="258"/>
+            <ac:inkMk id="185" creationId="{4F533585-1B3D-779C-6138-C432E7D0650F}"/>
+          </ac:inkMkLst>
+        </pc:inkChg>
+        <pc:inkChg chg="add del mod">
+          <ac:chgData name="נועם ליבוביץ" userId="4c2341a7ea8aa887" providerId="LiveId" clId="{3D0969C5-1F15-4295-88FA-413B1D0F027D}" dt="2024-11-25T12:57:49.270" v="476"/>
+          <ac:inkMkLst>
+            <pc:docMk/>
+            <pc:sldMk cId="3331921883" sldId="258"/>
+            <ac:inkMk id="186" creationId="{564511E2-3782-EF62-EFA9-3C7CE2AAF3E9}"/>
+          </ac:inkMkLst>
+        </pc:inkChg>
+        <pc:inkChg chg="add del mod">
+          <ac:chgData name="נועם ליבוביץ" userId="4c2341a7ea8aa887" providerId="LiveId" clId="{3D0969C5-1F15-4295-88FA-413B1D0F027D}" dt="2024-11-25T12:57:49.257" v="380"/>
+          <ac:inkMkLst>
+            <pc:docMk/>
+            <pc:sldMk cId="3331921883" sldId="258"/>
+            <ac:inkMk id="187" creationId="{B124DB52-9500-4987-45C2-7AA02E5FC072}"/>
+          </ac:inkMkLst>
+        </pc:inkChg>
+        <pc:inkChg chg="add del mod">
+          <ac:chgData name="נועם ליבוביץ" userId="4c2341a7ea8aa887" providerId="LiveId" clId="{3D0969C5-1F15-4295-88FA-413B1D0F027D}" dt="2024-11-25T12:57:49.268" v="462"/>
+          <ac:inkMkLst>
+            <pc:docMk/>
+            <pc:sldMk cId="3331921883" sldId="258"/>
+            <ac:inkMk id="188" creationId="{F3FDAE18-1D9A-117D-4B74-ADBF7696EF6B}"/>
+          </ac:inkMkLst>
+        </pc:inkChg>
+        <pc:inkChg chg="add del mod">
+          <ac:chgData name="נועם ליבוביץ" userId="4c2341a7ea8aa887" providerId="LiveId" clId="{3D0969C5-1F15-4295-88FA-413B1D0F027D}" dt="2024-11-25T12:57:49.255" v="374"/>
+          <ac:inkMkLst>
+            <pc:docMk/>
+            <pc:sldMk cId="3331921883" sldId="258"/>
+            <ac:inkMk id="189" creationId="{575DD55C-F209-0096-C12D-821614F0213A}"/>
+          </ac:inkMkLst>
+        </pc:inkChg>
+        <pc:inkChg chg="add del mod">
+          <ac:chgData name="נועם ליבוביץ" userId="4c2341a7ea8aa887" providerId="LiveId" clId="{3D0969C5-1F15-4295-88FA-413B1D0F027D}" dt="2024-11-25T12:57:49.263" v="427"/>
+          <ac:inkMkLst>
+            <pc:docMk/>
+            <pc:sldMk cId="3331921883" sldId="258"/>
+            <ac:inkMk id="190" creationId="{C72575FF-1B3B-8AF8-BF60-A2FB8DB1C57F}"/>
+          </ac:inkMkLst>
+        </pc:inkChg>
+        <pc:inkChg chg="add del mod">
+          <ac:chgData name="נועם ליבוביץ" userId="4c2341a7ea8aa887" providerId="LiveId" clId="{3D0969C5-1F15-4295-88FA-413B1D0F027D}" dt="2024-11-25T12:57:49.260" v="403"/>
+          <ac:inkMkLst>
+            <pc:docMk/>
+            <pc:sldMk cId="3331921883" sldId="258"/>
+            <ac:inkMk id="191" creationId="{E83301E0-2A46-7102-09E9-C65CE20F86DA}"/>
+          </ac:inkMkLst>
+        </pc:inkChg>
+        <pc:inkChg chg="add del">
+          <ac:chgData name="נועם ליבוביץ" userId="4c2341a7ea8aa887" providerId="LiveId" clId="{3D0969C5-1F15-4295-88FA-413B1D0F027D}" dt="2024-11-25T12:57:13.112" v="355"/>
+          <ac:inkMkLst>
+            <pc:docMk/>
+            <pc:sldMk cId="3331921883" sldId="258"/>
+            <ac:inkMk id="193" creationId="{622E2B07-9BCD-37B4-074F-95690AE0675E}"/>
+          </ac:inkMkLst>
+        </pc:inkChg>
+        <pc:inkChg chg="add del">
+          <ac:chgData name="נועם ליבוביץ" userId="4c2341a7ea8aa887" providerId="LiveId" clId="{3D0969C5-1F15-4295-88FA-413B1D0F027D}" dt="2024-11-25T12:57:49.264" v="432"/>
+          <ac:inkMkLst>
+            <pc:docMk/>
+            <pc:sldMk cId="3331921883" sldId="258"/>
+            <ac:inkMk id="194" creationId="{F5F0CD16-DFB2-CC47-169F-94A17CDDC512}"/>
+          </ac:inkMkLst>
+        </pc:inkChg>
+        <pc:inkChg chg="add del">
+          <ac:chgData name="נועם ליבוביץ" userId="4c2341a7ea8aa887" providerId="LiveId" clId="{3D0969C5-1F15-4295-88FA-413B1D0F027D}" dt="2024-11-25T12:57:17.392" v="357"/>
+          <ac:inkMkLst>
+            <pc:docMk/>
+            <pc:sldMk cId="3331921883" sldId="258"/>
+            <ac:inkMk id="195" creationId="{774A9033-07D6-C027-5BE5-FC081CBBF2C6}"/>
+          </ac:inkMkLst>
+        </pc:inkChg>
+        <pc:inkChg chg="add del">
+          <ac:chgData name="נועם ליבוביץ" userId="4c2341a7ea8aa887" providerId="LiveId" clId="{3D0969C5-1F15-4295-88FA-413B1D0F027D}" dt="2024-11-25T12:57:49.257" v="386"/>
+          <ac:inkMkLst>
+            <pc:docMk/>
+            <pc:sldMk cId="3331921883" sldId="258"/>
+            <ac:inkMk id="196" creationId="{E0C0EEDF-3858-1BFA-0AD2-E14F4ABAAEDE}"/>
+          </ac:inkMkLst>
+        </pc:inkChg>
+        <pc:inkChg chg="add del">
+          <ac:chgData name="נועם ליבוביץ" userId="4c2341a7ea8aa887" providerId="LiveId" clId="{3D0969C5-1F15-4295-88FA-413B1D0F027D}" dt="2024-11-25T12:57:22.155" v="359"/>
+          <ac:inkMkLst>
+            <pc:docMk/>
+            <pc:sldMk cId="3331921883" sldId="258"/>
+            <ac:inkMk id="197" creationId="{37B23986-70E6-6497-3ACB-E650CACA9F3C}"/>
+          </ac:inkMkLst>
+        </pc:inkChg>
+        <pc:inkChg chg="add del mod">
+          <ac:chgData name="נועם ליבוביץ" userId="4c2341a7ea8aa887" providerId="LiveId" clId="{3D0969C5-1F15-4295-88FA-413B1D0F027D}" dt="2024-11-25T12:57:49.265" v="446"/>
+          <ac:inkMkLst>
+            <pc:docMk/>
+            <pc:sldMk cId="3331921883" sldId="258"/>
+            <ac:inkMk id="198" creationId="{3C69E603-BF40-FA12-EDC7-665799E98C85}"/>
+          </ac:inkMkLst>
+        </pc:inkChg>
+        <pc:inkChg chg="add del">
+          <ac:chgData name="נועם ליבוביץ" userId="4c2341a7ea8aa887" providerId="LiveId" clId="{3D0969C5-1F15-4295-88FA-413B1D0F027D}" dt="2024-11-25T12:57:25.083" v="362"/>
+          <ac:inkMkLst>
+            <pc:docMk/>
+            <pc:sldMk cId="3331921883" sldId="258"/>
+            <ac:inkMk id="199" creationId="{5EC684DE-8337-49B8-F6EE-C57F13D3B76C}"/>
+          </ac:inkMkLst>
+        </pc:inkChg>
+        <pc:inkChg chg="add del">
+          <ac:chgData name="נועם ליבוביץ" userId="4c2341a7ea8aa887" providerId="LiveId" clId="{3D0969C5-1F15-4295-88FA-413B1D0F027D}" dt="2024-11-25T12:57:49.270" v="474"/>
+          <ac:inkMkLst>
+            <pc:docMk/>
+            <pc:sldMk cId="3331921883" sldId="258"/>
+            <ac:inkMk id="200" creationId="{B2B09715-A267-D814-6358-F5E5ED49A5F0}"/>
+          </ac:inkMkLst>
+        </pc:inkChg>
+        <pc:inkChg chg="add del">
+          <ac:chgData name="נועם ליבוביץ" userId="4c2341a7ea8aa887" providerId="LiveId" clId="{3D0969C5-1F15-4295-88FA-413B1D0F027D}" dt="2024-11-25T12:57:28.823" v="364"/>
+          <ac:inkMkLst>
+            <pc:docMk/>
+            <pc:sldMk cId="3331921883" sldId="258"/>
+            <ac:inkMk id="201" creationId="{0E28BC1D-B192-E115-8AE9-E7E9C4A2DE10}"/>
+          </ac:inkMkLst>
+        </pc:inkChg>
+        <pc:inkChg chg="add del">
+          <ac:chgData name="נועם ליבוביץ" userId="4c2341a7ea8aa887" providerId="LiveId" clId="{3D0969C5-1F15-4295-88FA-413B1D0F027D}" dt="2024-11-25T12:57:49.266" v="447"/>
+          <ac:inkMkLst>
+            <pc:docMk/>
+            <pc:sldMk cId="3331921883" sldId="258"/>
+            <ac:inkMk id="202" creationId="{454B104F-ACCC-D260-C91E-ABDE9677B973}"/>
+          </ac:inkMkLst>
+        </pc:inkChg>
+      </pc:sldChg>
+    </pc:docChg>
+  </pc:docChgLst>
+</pc:chgInfo>
 </file>
 
 <file path=ppt/slideLayouts/slideLayout1.xml><?xml version="1.0" encoding="utf-8"?>
@@ -254,7 +2064,7 @@
           <a:p>
             <a:fld id="{0F8A4E79-BE57-45DC-BCC8-E7F7EB958D06}" type="datetimeFigureOut">
               <a:rPr lang="he-IL" smtClean="0"/>
-              <a:t>י"ז/חשון/תשפ"ה</a:t>
+              <a:t>כ"ד/חשון/תשפ"ה</a:t>
             </a:fld>
             <a:endParaRPr lang="he-IL"/>
           </a:p>
@@ -452,7 +2262,7 @@
           <a:p>
             <a:fld id="{0F8A4E79-BE57-45DC-BCC8-E7F7EB958D06}" type="datetimeFigureOut">
               <a:rPr lang="he-IL" smtClean="0"/>
-              <a:t>י"ז/חשון/תשפ"ה</a:t>
+              <a:t>כ"ד/חשון/תשפ"ה</a:t>
             </a:fld>
             <a:endParaRPr lang="he-IL"/>
           </a:p>
@@ -660,7 +2470,7 @@
           <a:p>
             <a:fld id="{0F8A4E79-BE57-45DC-BCC8-E7F7EB958D06}" type="datetimeFigureOut">
               <a:rPr lang="he-IL" smtClean="0"/>
-              <a:t>י"ז/חשון/תשפ"ה</a:t>
+              <a:t>כ"ד/חשון/תשפ"ה</a:t>
             </a:fld>
             <a:endParaRPr lang="he-IL"/>
           </a:p>
@@ -858,7 +2668,7 @@
           <a:p>
             <a:fld id="{0F8A4E79-BE57-45DC-BCC8-E7F7EB958D06}" type="datetimeFigureOut">
               <a:rPr lang="he-IL" smtClean="0"/>
-              <a:t>י"ז/חשון/תשפ"ה</a:t>
+              <a:t>כ"ד/חשון/תשפ"ה</a:t>
             </a:fld>
             <a:endParaRPr lang="he-IL"/>
           </a:p>
@@ -1133,7 +2943,7 @@
           <a:p>
             <a:fld id="{0F8A4E79-BE57-45DC-BCC8-E7F7EB958D06}" type="datetimeFigureOut">
               <a:rPr lang="he-IL" smtClean="0"/>
-              <a:t>י"ז/חשון/תשפ"ה</a:t>
+              <a:t>כ"ד/חשון/תשפ"ה</a:t>
             </a:fld>
             <a:endParaRPr lang="he-IL"/>
           </a:p>
@@ -1398,7 +3208,7 @@
           <a:p>
             <a:fld id="{0F8A4E79-BE57-45DC-BCC8-E7F7EB958D06}" type="datetimeFigureOut">
               <a:rPr lang="he-IL" smtClean="0"/>
-              <a:t>י"ז/חשון/תשפ"ה</a:t>
+              <a:t>כ"ד/חשון/תשפ"ה</a:t>
             </a:fld>
             <a:endParaRPr lang="he-IL"/>
           </a:p>
@@ -1810,7 +3620,7 @@
           <a:p>
             <a:fld id="{0F8A4E79-BE57-45DC-BCC8-E7F7EB958D06}" type="datetimeFigureOut">
               <a:rPr lang="he-IL" smtClean="0"/>
-              <a:t>י"ז/חשון/תשפ"ה</a:t>
+              <a:t>כ"ד/חשון/תשפ"ה</a:t>
             </a:fld>
             <a:endParaRPr lang="he-IL"/>
           </a:p>
@@ -1951,7 +3761,7 @@
           <a:p>
             <a:fld id="{0F8A4E79-BE57-45DC-BCC8-E7F7EB958D06}" type="datetimeFigureOut">
               <a:rPr lang="he-IL" smtClean="0"/>
-              <a:t>י"ז/חשון/תשפ"ה</a:t>
+              <a:t>כ"ד/חשון/תשפ"ה</a:t>
             </a:fld>
             <a:endParaRPr lang="he-IL"/>
           </a:p>
@@ -2064,7 +3874,7 @@
           <a:p>
             <a:fld id="{0F8A4E79-BE57-45DC-BCC8-E7F7EB958D06}" type="datetimeFigureOut">
               <a:rPr lang="he-IL" smtClean="0"/>
-              <a:t>י"ז/חשון/תשפ"ה</a:t>
+              <a:t>כ"ד/חשון/תשפ"ה</a:t>
             </a:fld>
             <a:endParaRPr lang="he-IL"/>
           </a:p>
@@ -2375,7 +4185,7 @@
           <a:p>
             <a:fld id="{0F8A4E79-BE57-45DC-BCC8-E7F7EB958D06}" type="datetimeFigureOut">
               <a:rPr lang="he-IL" smtClean="0"/>
-              <a:t>י"ז/חשון/תשפ"ה</a:t>
+              <a:t>כ"ד/חשון/תשפ"ה</a:t>
             </a:fld>
             <a:endParaRPr lang="he-IL"/>
           </a:p>
@@ -2663,7 +4473,7 @@
           <a:p>
             <a:fld id="{0F8A4E79-BE57-45DC-BCC8-E7F7EB958D06}" type="datetimeFigureOut">
               <a:rPr lang="he-IL" smtClean="0"/>
-              <a:t>י"ז/חשון/תשפ"ה</a:t>
+              <a:t>כ"ד/חשון/תשפ"ה</a:t>
             </a:fld>
             <a:endParaRPr lang="he-IL"/>
           </a:p>
@@ -2904,7 +4714,7 @@
           <a:p>
             <a:fld id="{0F8A4E79-BE57-45DC-BCC8-E7F7EB958D06}" type="datetimeFigureOut">
               <a:rPr lang="he-IL" smtClean="0"/>
-              <a:t>י"ז/חשון/תשפ"ה</a:t>
+              <a:t>כ"ד/חשון/תשפ"ה</a:t>
             </a:fld>
             <a:endParaRPr lang="he-IL"/>
           </a:p>
@@ -3552,7 +5362,7 @@
               <a:pPr algn="ctr"/>
               <a:r>
                 <a:rPr lang="he-IL" dirty="0"/>
-                <a:t>פונה לאבא עם הבקשה</a:t>
+                <a:t>פונה לאבא(סרבר) עם הבקשה</a:t>
               </a:r>
             </a:p>
             <a:p>
@@ -4721,10 +6531,778 @@
           </a:fontRef>
         </p:style>
       </p:cxnSp>
+      <p:sp>
+        <p:nvSpPr>
+          <p:cNvPr id="2" name="מלבן 1">
+            <a:extLst>
+              <a:ext uri="{FF2B5EF4-FFF2-40B4-BE49-F238E27FC236}">
+                <a16:creationId xmlns:a16="http://schemas.microsoft.com/office/drawing/2014/main" id="{D34DC808-7425-641D-B465-D5CB92E92707}"/>
+              </a:ext>
+            </a:extLst>
+          </p:cNvPr>
+          <p:cNvSpPr/>
+          <p:nvPr/>
+        </p:nvSpPr>
+        <p:spPr>
+          <a:xfrm>
+            <a:off x="59485" y="156029"/>
+            <a:ext cx="957662" cy="1848465"/>
+          </a:xfrm>
+          <a:prstGeom prst="rect">
+            <a:avLst/>
+          </a:prstGeom>
+          <a:solidFill>
+            <a:srgbClr val="E5F73B"/>
+          </a:solidFill>
+        </p:spPr>
+        <p:style>
+          <a:lnRef idx="2">
+            <a:schemeClr val="accent1">
+              <a:shade val="15000"/>
+            </a:schemeClr>
+          </a:lnRef>
+          <a:fillRef idx="1">
+            <a:schemeClr val="accent1"/>
+          </a:fillRef>
+          <a:effectRef idx="0">
+            <a:schemeClr val="accent1"/>
+          </a:effectRef>
+          <a:fontRef idx="minor">
+            <a:schemeClr val="lt1"/>
+          </a:fontRef>
+        </p:style>
+        <p:txBody>
+          <a:bodyPr rtlCol="1" anchor="ctr"/>
+          <a:lstStyle/>
+          <a:p>
+            <a:pPr algn="ctr"/>
+            <a:r>
+              <a:rPr lang="he-IL" dirty="0">
+                <a:solidFill>
+                  <a:srgbClr val="FF0000"/>
+                </a:solidFill>
+              </a:rPr>
+              <a:t>קלינט שולח בקשה </a:t>
+            </a:r>
+            <a:r>
+              <a:rPr lang="he-IL" dirty="0" err="1">
+                <a:solidFill>
+                  <a:srgbClr val="FF0000"/>
+                </a:solidFill>
+              </a:rPr>
+              <a:t>לריזולבר</a:t>
+            </a:r>
+            <a:r>
+              <a:rPr lang="he-IL" dirty="0">
+                <a:solidFill>
+                  <a:srgbClr val="FF0000"/>
+                </a:solidFill>
+              </a:rPr>
+              <a:t>!!!</a:t>
+            </a:r>
+          </a:p>
+        </p:txBody>
+      </p:sp>
+      <p:cxnSp>
+        <p:nvCxnSpPr>
+          <p:cNvPr id="3" name="מחבר חץ ישר 2">
+            <a:extLst>
+              <a:ext uri="{FF2B5EF4-FFF2-40B4-BE49-F238E27FC236}">
+                <a16:creationId xmlns:a16="http://schemas.microsoft.com/office/drawing/2014/main" id="{0D533966-E6F2-5542-BEBD-F2556A28A671}"/>
+              </a:ext>
+            </a:extLst>
+          </p:cNvPr>
+          <p:cNvCxnSpPr>
+            <a:cxnSpLocks/>
+            <a:stCxn id="2" idx="2"/>
+            <a:endCxn id="4" idx="1"/>
+          </p:cNvCxnSpPr>
+          <p:nvPr/>
+        </p:nvCxnSpPr>
+        <p:spPr>
+          <a:xfrm>
+            <a:off x="538316" y="2004494"/>
+            <a:ext cx="478831" cy="1977571"/>
+          </a:xfrm>
+          <a:prstGeom prst="straightConnector1">
+            <a:avLst/>
+          </a:prstGeom>
+          <a:ln>
+            <a:tailEnd type="triangle"/>
+          </a:ln>
+        </p:spPr>
+        <p:style>
+          <a:lnRef idx="2">
+            <a:schemeClr val="accent1"/>
+          </a:lnRef>
+          <a:fillRef idx="0">
+            <a:schemeClr val="accent1"/>
+          </a:fillRef>
+          <a:effectRef idx="1">
+            <a:schemeClr val="accent1"/>
+          </a:effectRef>
+          <a:fontRef idx="minor">
+            <a:schemeClr val="tx1"/>
+          </a:fontRef>
+        </p:style>
+      </p:cxnSp>
     </p:spTree>
     <p:extLst>
       <p:ext uri="{BB962C8B-B14F-4D97-AF65-F5344CB8AC3E}">
         <p14:creationId xmlns:p14="http://schemas.microsoft.com/office/powerpoint/2010/main" val="309714252"/>
+      </p:ext>
+    </p:extLst>
+  </p:cSld>
+  <p:clrMapOvr>
+    <a:masterClrMapping/>
+  </p:clrMapOvr>
+</p:sld>
+</file>
+
+<file path=ppt/slides/slide2.xml><?xml version="1.0" encoding="utf-8"?>
+<p:sld xmlns:a="http://schemas.openxmlformats.org/drawingml/2006/main" xmlns:r="http://schemas.openxmlformats.org/officeDocument/2006/relationships" xmlns:p="http://schemas.openxmlformats.org/presentationml/2006/main">
+  <p:cSld>
+    <p:spTree>
+      <p:nvGrpSpPr>
+        <p:cNvPr id="1" name=""/>
+        <p:cNvGrpSpPr/>
+        <p:nvPr/>
+      </p:nvGrpSpPr>
+      <p:grpSpPr>
+        <a:xfrm>
+          <a:off x="0" y="0"/>
+          <a:ext cx="0" cy="0"/>
+          <a:chOff x="0" y="0"/>
+          <a:chExt cx="0" cy="0"/>
+        </a:xfrm>
+      </p:grpSpPr>
+      <p:sp>
+        <p:nvSpPr>
+          <p:cNvPr id="4" name="אליפסה 3">
+            <a:extLst>
+              <a:ext uri="{FF2B5EF4-FFF2-40B4-BE49-F238E27FC236}">
+                <a16:creationId xmlns:a16="http://schemas.microsoft.com/office/drawing/2014/main" id="{164E5F31-98C1-9C69-69F7-A0BB59A7A943}"/>
+              </a:ext>
+            </a:extLst>
+          </p:cNvPr>
+          <p:cNvSpPr/>
+          <p:nvPr/>
+        </p:nvSpPr>
+        <p:spPr>
+          <a:xfrm>
+            <a:off x="4800600" y="3172968"/>
+            <a:ext cx="2185416" cy="685800"/>
+          </a:xfrm>
+          <a:prstGeom prst="ellipse">
+            <a:avLst/>
+          </a:prstGeom>
+        </p:spPr>
+        <p:style>
+          <a:lnRef idx="2">
+            <a:schemeClr val="accent1">
+              <a:shade val="15000"/>
+            </a:schemeClr>
+          </a:lnRef>
+          <a:fillRef idx="1">
+            <a:schemeClr val="accent1"/>
+          </a:fillRef>
+          <a:effectRef idx="0">
+            <a:schemeClr val="accent1"/>
+          </a:effectRef>
+          <a:fontRef idx="minor">
+            <a:schemeClr val="lt1"/>
+          </a:fontRef>
+        </p:style>
+        <p:txBody>
+          <a:bodyPr rtlCol="1" anchor="ctr"/>
+          <a:lstStyle/>
+          <a:p>
+            <a:pPr algn="ctr"/>
+            <a:r>
+              <a:rPr lang="he-IL" dirty="0" err="1"/>
+              <a:t>ריזולבר</a:t>
+            </a:r>
+            <a:endParaRPr lang="he-IL" dirty="0"/>
+          </a:p>
+        </p:txBody>
+      </p:sp>
+      <p:sp>
+        <p:nvSpPr>
+          <p:cNvPr id="5" name="אליפסה 4">
+            <a:extLst>
+              <a:ext uri="{FF2B5EF4-FFF2-40B4-BE49-F238E27FC236}">
+                <a16:creationId xmlns:a16="http://schemas.microsoft.com/office/drawing/2014/main" id="{24ED442B-1DA6-B283-6695-D9AF02F7286C}"/>
+              </a:ext>
+            </a:extLst>
+          </p:cNvPr>
+          <p:cNvSpPr/>
+          <p:nvPr/>
+        </p:nvSpPr>
+        <p:spPr>
+          <a:xfrm>
+            <a:off x="5003292" y="4724400"/>
+            <a:ext cx="2185416" cy="685800"/>
+          </a:xfrm>
+          <a:prstGeom prst="ellipse">
+            <a:avLst/>
+          </a:prstGeom>
+        </p:spPr>
+        <p:style>
+          <a:lnRef idx="2">
+            <a:schemeClr val="accent2">
+              <a:shade val="15000"/>
+            </a:schemeClr>
+          </a:lnRef>
+          <a:fillRef idx="1">
+            <a:schemeClr val="accent2"/>
+          </a:fillRef>
+          <a:effectRef idx="0">
+            <a:schemeClr val="accent2"/>
+          </a:effectRef>
+          <a:fontRef idx="minor">
+            <a:schemeClr val="lt1"/>
+          </a:fontRef>
+        </p:style>
+        <p:txBody>
+          <a:bodyPr rtlCol="1" anchor="ctr"/>
+          <a:lstStyle/>
+          <a:p>
+            <a:pPr algn="ctr"/>
+            <a:r>
+              <a:rPr lang="he-IL" dirty="0"/>
+              <a:t>קליינט</a:t>
+            </a:r>
+          </a:p>
+        </p:txBody>
+      </p:sp>
+      <p:sp>
+        <p:nvSpPr>
+          <p:cNvPr id="6" name="אליפסה 5">
+            <a:extLst>
+              <a:ext uri="{FF2B5EF4-FFF2-40B4-BE49-F238E27FC236}">
+                <a16:creationId xmlns:a16="http://schemas.microsoft.com/office/drawing/2014/main" id="{10BAE424-709F-3FFF-983A-920B53EAA544}"/>
+              </a:ext>
+            </a:extLst>
+          </p:cNvPr>
+          <p:cNvSpPr/>
+          <p:nvPr/>
+        </p:nvSpPr>
+        <p:spPr>
+          <a:xfrm>
+            <a:off x="2749296" y="1711452"/>
+            <a:ext cx="2185416" cy="685800"/>
+          </a:xfrm>
+          <a:prstGeom prst="ellipse">
+            <a:avLst/>
+          </a:prstGeom>
+        </p:spPr>
+        <p:style>
+          <a:lnRef idx="2">
+            <a:schemeClr val="accent5">
+              <a:shade val="15000"/>
+            </a:schemeClr>
+          </a:lnRef>
+          <a:fillRef idx="1">
+            <a:schemeClr val="accent5"/>
+          </a:fillRef>
+          <a:effectRef idx="0">
+            <a:schemeClr val="accent5"/>
+          </a:effectRef>
+          <a:fontRef idx="minor">
+            <a:schemeClr val="lt1"/>
+          </a:fontRef>
+        </p:style>
+        <p:txBody>
+          <a:bodyPr rtlCol="1" anchor="ctr"/>
+          <a:lstStyle/>
+          <a:p>
+            <a:pPr algn="ctr"/>
+            <a:r>
+              <a:rPr lang="he-IL" dirty="0"/>
+              <a:t>שרת</a:t>
+            </a:r>
+          </a:p>
+        </p:txBody>
+      </p:sp>
+      <p:sp>
+        <p:nvSpPr>
+          <p:cNvPr id="7" name="אליפסה 6">
+            <a:extLst>
+              <a:ext uri="{FF2B5EF4-FFF2-40B4-BE49-F238E27FC236}">
+                <a16:creationId xmlns:a16="http://schemas.microsoft.com/office/drawing/2014/main" id="{24AF0CB8-ED91-CB73-11ED-532B851DD8D6}"/>
+              </a:ext>
+            </a:extLst>
+          </p:cNvPr>
+          <p:cNvSpPr/>
+          <p:nvPr/>
+        </p:nvSpPr>
+        <p:spPr>
+          <a:xfrm>
+            <a:off x="5190744" y="1756410"/>
+            <a:ext cx="2185416" cy="685800"/>
+          </a:xfrm>
+          <a:prstGeom prst="ellipse">
+            <a:avLst/>
+          </a:prstGeom>
+        </p:spPr>
+        <p:style>
+          <a:lnRef idx="2">
+            <a:schemeClr val="accent5">
+              <a:shade val="15000"/>
+            </a:schemeClr>
+          </a:lnRef>
+          <a:fillRef idx="1">
+            <a:schemeClr val="accent5"/>
+          </a:fillRef>
+          <a:effectRef idx="0">
+            <a:schemeClr val="accent5"/>
+          </a:effectRef>
+          <a:fontRef idx="minor">
+            <a:schemeClr val="lt1"/>
+          </a:fontRef>
+        </p:style>
+        <p:txBody>
+          <a:bodyPr rtlCol="1" anchor="ctr"/>
+          <a:lstStyle/>
+          <a:p>
+            <a:pPr algn="ctr"/>
+            <a:r>
+              <a:rPr lang="he-IL" dirty="0"/>
+              <a:t>שרת</a:t>
+            </a:r>
+          </a:p>
+        </p:txBody>
+      </p:sp>
+      <p:sp>
+        <p:nvSpPr>
+          <p:cNvPr id="8" name="אליפסה 7">
+            <a:extLst>
+              <a:ext uri="{FF2B5EF4-FFF2-40B4-BE49-F238E27FC236}">
+                <a16:creationId xmlns:a16="http://schemas.microsoft.com/office/drawing/2014/main" id="{621B158F-0369-19CD-0DCB-CD901A9116CF}"/>
+              </a:ext>
+            </a:extLst>
+          </p:cNvPr>
+          <p:cNvSpPr/>
+          <p:nvPr/>
+        </p:nvSpPr>
+        <p:spPr>
+          <a:xfrm>
+            <a:off x="7723632" y="1756410"/>
+            <a:ext cx="2185416" cy="685800"/>
+          </a:xfrm>
+          <a:prstGeom prst="ellipse">
+            <a:avLst/>
+          </a:prstGeom>
+        </p:spPr>
+        <p:style>
+          <a:lnRef idx="2">
+            <a:schemeClr val="accent5">
+              <a:shade val="15000"/>
+            </a:schemeClr>
+          </a:lnRef>
+          <a:fillRef idx="1">
+            <a:schemeClr val="accent5"/>
+          </a:fillRef>
+          <a:effectRef idx="0">
+            <a:schemeClr val="accent5"/>
+          </a:effectRef>
+          <a:fontRef idx="minor">
+            <a:schemeClr val="lt1"/>
+          </a:fontRef>
+        </p:style>
+        <p:txBody>
+          <a:bodyPr rtlCol="1" anchor="ctr"/>
+          <a:lstStyle/>
+          <a:p>
+            <a:pPr algn="ctr"/>
+            <a:r>
+              <a:rPr lang="he-IL" dirty="0"/>
+              <a:t>שרת</a:t>
+            </a:r>
+          </a:p>
+        </p:txBody>
+      </p:sp>
+      <p:cxnSp>
+        <p:nvCxnSpPr>
+          <p:cNvPr id="13" name="מחבר: מעוקל 12">
+            <a:extLst>
+              <a:ext uri="{FF2B5EF4-FFF2-40B4-BE49-F238E27FC236}">
+                <a16:creationId xmlns:a16="http://schemas.microsoft.com/office/drawing/2014/main" id="{9E7BA48D-7063-DFF7-01FD-FD4BC7392F39}"/>
+              </a:ext>
+            </a:extLst>
+          </p:cNvPr>
+          <p:cNvCxnSpPr>
+            <a:stCxn id="4" idx="5"/>
+            <a:endCxn id="5" idx="6"/>
+          </p:cNvCxnSpPr>
+          <p:nvPr/>
+        </p:nvCxnSpPr>
+        <p:spPr>
+          <a:xfrm rot="16200000" flipH="1">
+            <a:off x="6272856" y="4151447"/>
+            <a:ext cx="1308965" cy="522739"/>
+          </a:xfrm>
+          <a:prstGeom prst="curvedConnector4">
+            <a:avLst>
+              <a:gd name="adj1" fmla="val 33066"/>
+              <a:gd name="adj2" fmla="val 143731"/>
+            </a:avLst>
+          </a:prstGeom>
+          <a:ln>
+            <a:tailEnd type="triangle"/>
+          </a:ln>
+        </p:spPr>
+        <p:style>
+          <a:lnRef idx="2">
+            <a:schemeClr val="accent6"/>
+          </a:lnRef>
+          <a:fillRef idx="0">
+            <a:schemeClr val="accent6"/>
+          </a:fillRef>
+          <a:effectRef idx="1">
+            <a:schemeClr val="accent6"/>
+          </a:effectRef>
+          <a:fontRef idx="minor">
+            <a:schemeClr val="tx1"/>
+          </a:fontRef>
+        </p:style>
+      </p:cxnSp>
+      <p:cxnSp>
+        <p:nvCxnSpPr>
+          <p:cNvPr id="14" name="מחבר: מעוקל 13">
+            <a:extLst>
+              <a:ext uri="{FF2B5EF4-FFF2-40B4-BE49-F238E27FC236}">
+                <a16:creationId xmlns:a16="http://schemas.microsoft.com/office/drawing/2014/main" id="{8ADE21A8-FE87-448E-BE3C-454AE7E7B8D7}"/>
+              </a:ext>
+            </a:extLst>
+          </p:cNvPr>
+          <p:cNvCxnSpPr>
+            <a:cxnSpLocks/>
+            <a:stCxn id="5" idx="2"/>
+            <a:endCxn id="4" idx="2"/>
+          </p:cNvCxnSpPr>
+          <p:nvPr/>
+        </p:nvCxnSpPr>
+        <p:spPr>
+          <a:xfrm rot="10800000">
+            <a:off x="4800600" y="3515868"/>
+            <a:ext cx="202692" cy="1551432"/>
+          </a:xfrm>
+          <a:prstGeom prst="curvedConnector3">
+            <a:avLst>
+              <a:gd name="adj1" fmla="val 212782"/>
+            </a:avLst>
+          </a:prstGeom>
+          <a:ln>
+            <a:tailEnd type="triangle"/>
+          </a:ln>
+        </p:spPr>
+        <p:style>
+          <a:lnRef idx="2">
+            <a:schemeClr val="accent1"/>
+          </a:lnRef>
+          <a:fillRef idx="0">
+            <a:schemeClr val="accent1"/>
+          </a:fillRef>
+          <a:effectRef idx="1">
+            <a:schemeClr val="accent1"/>
+          </a:effectRef>
+          <a:fontRef idx="minor">
+            <a:schemeClr val="tx1"/>
+          </a:fontRef>
+        </p:style>
+      </p:cxnSp>
+      <p:cxnSp>
+        <p:nvCxnSpPr>
+          <p:cNvPr id="18" name="מחבר חץ ישר 17">
+            <a:extLst>
+              <a:ext uri="{FF2B5EF4-FFF2-40B4-BE49-F238E27FC236}">
+                <a16:creationId xmlns:a16="http://schemas.microsoft.com/office/drawing/2014/main" id="{5AC2F060-E5FC-E432-3023-3C2EDC0AB6AC}"/>
+              </a:ext>
+            </a:extLst>
+          </p:cNvPr>
+          <p:cNvCxnSpPr>
+            <a:stCxn id="4" idx="2"/>
+            <a:endCxn id="6" idx="3"/>
+          </p:cNvCxnSpPr>
+          <p:nvPr/>
+        </p:nvCxnSpPr>
+        <p:spPr>
+          <a:xfrm flipH="1" flipV="1">
+            <a:off x="3069343" y="2296819"/>
+            <a:ext cx="1731257" cy="1219049"/>
+          </a:xfrm>
+          <a:prstGeom prst="straightConnector1">
+            <a:avLst/>
+          </a:prstGeom>
+          <a:ln>
+            <a:tailEnd type="triangle"/>
+          </a:ln>
+        </p:spPr>
+        <p:style>
+          <a:lnRef idx="2">
+            <a:schemeClr val="accent1"/>
+          </a:lnRef>
+          <a:fillRef idx="0">
+            <a:schemeClr val="accent1"/>
+          </a:fillRef>
+          <a:effectRef idx="1">
+            <a:schemeClr val="accent1"/>
+          </a:effectRef>
+          <a:fontRef idx="minor">
+            <a:schemeClr val="tx1"/>
+          </a:fontRef>
+        </p:style>
+      </p:cxnSp>
+      <p:cxnSp>
+        <p:nvCxnSpPr>
+          <p:cNvPr id="19" name="מחבר חץ ישר 18">
+            <a:extLst>
+              <a:ext uri="{FF2B5EF4-FFF2-40B4-BE49-F238E27FC236}">
+                <a16:creationId xmlns:a16="http://schemas.microsoft.com/office/drawing/2014/main" id="{11B79FED-619B-09F8-2E46-B84D19B39396}"/>
+              </a:ext>
+            </a:extLst>
+          </p:cNvPr>
+          <p:cNvCxnSpPr>
+            <a:cxnSpLocks/>
+            <a:stCxn id="6" idx="4"/>
+            <a:endCxn id="4" idx="1"/>
+          </p:cNvCxnSpPr>
+          <p:nvPr/>
+        </p:nvCxnSpPr>
+        <p:spPr>
+          <a:xfrm>
+            <a:off x="3842004" y="2397252"/>
+            <a:ext cx="1278643" cy="876149"/>
+          </a:xfrm>
+          <a:prstGeom prst="straightConnector1">
+            <a:avLst/>
+          </a:prstGeom>
+          <a:ln>
+            <a:tailEnd type="triangle"/>
+          </a:ln>
+        </p:spPr>
+        <p:style>
+          <a:lnRef idx="2">
+            <a:schemeClr val="accent1"/>
+          </a:lnRef>
+          <a:fillRef idx="0">
+            <a:schemeClr val="accent1"/>
+          </a:fillRef>
+          <a:effectRef idx="1">
+            <a:schemeClr val="accent1"/>
+          </a:effectRef>
+          <a:fontRef idx="minor">
+            <a:schemeClr val="tx1"/>
+          </a:fontRef>
+        </p:style>
+      </p:cxnSp>
+      <p:cxnSp>
+        <p:nvCxnSpPr>
+          <p:cNvPr id="22" name="מחבר חץ ישר 21">
+            <a:extLst>
+              <a:ext uri="{FF2B5EF4-FFF2-40B4-BE49-F238E27FC236}">
+                <a16:creationId xmlns:a16="http://schemas.microsoft.com/office/drawing/2014/main" id="{054C4C0D-7B95-65FF-0E3D-F5AD780F49ED}"/>
+              </a:ext>
+            </a:extLst>
+          </p:cNvPr>
+          <p:cNvCxnSpPr>
+            <a:cxnSpLocks/>
+            <a:stCxn id="4" idx="0"/>
+            <a:endCxn id="7" idx="3"/>
+          </p:cNvCxnSpPr>
+          <p:nvPr/>
+        </p:nvCxnSpPr>
+        <p:spPr>
+          <a:xfrm flipH="1" flipV="1">
+            <a:off x="5510791" y="2341777"/>
+            <a:ext cx="382517" cy="831191"/>
+          </a:xfrm>
+          <a:prstGeom prst="straightConnector1">
+            <a:avLst/>
+          </a:prstGeom>
+          <a:ln>
+            <a:tailEnd type="triangle"/>
+          </a:ln>
+        </p:spPr>
+        <p:style>
+          <a:lnRef idx="2">
+            <a:schemeClr val="accent1"/>
+          </a:lnRef>
+          <a:fillRef idx="0">
+            <a:schemeClr val="accent1"/>
+          </a:fillRef>
+          <a:effectRef idx="1">
+            <a:schemeClr val="accent1"/>
+          </a:effectRef>
+          <a:fontRef idx="minor">
+            <a:schemeClr val="tx1"/>
+          </a:fontRef>
+        </p:style>
+      </p:cxnSp>
+      <p:cxnSp>
+        <p:nvCxnSpPr>
+          <p:cNvPr id="25" name="מחבר חץ ישר 24">
+            <a:extLst>
+              <a:ext uri="{FF2B5EF4-FFF2-40B4-BE49-F238E27FC236}">
+                <a16:creationId xmlns:a16="http://schemas.microsoft.com/office/drawing/2014/main" id="{2C4025E6-5058-C305-08B1-3576DB444E4E}"/>
+              </a:ext>
+            </a:extLst>
+          </p:cNvPr>
+          <p:cNvCxnSpPr>
+            <a:cxnSpLocks/>
+            <a:stCxn id="7" idx="4"/>
+            <a:endCxn id="4" idx="7"/>
+          </p:cNvCxnSpPr>
+          <p:nvPr/>
+        </p:nvCxnSpPr>
+        <p:spPr>
+          <a:xfrm>
+            <a:off x="6283452" y="2442210"/>
+            <a:ext cx="382517" cy="831191"/>
+          </a:xfrm>
+          <a:prstGeom prst="straightConnector1">
+            <a:avLst/>
+          </a:prstGeom>
+          <a:ln>
+            <a:tailEnd type="triangle"/>
+          </a:ln>
+        </p:spPr>
+        <p:style>
+          <a:lnRef idx="2">
+            <a:schemeClr val="accent1"/>
+          </a:lnRef>
+          <a:fillRef idx="0">
+            <a:schemeClr val="accent1"/>
+          </a:fillRef>
+          <a:effectRef idx="1">
+            <a:schemeClr val="accent1"/>
+          </a:effectRef>
+          <a:fontRef idx="minor">
+            <a:schemeClr val="tx1"/>
+          </a:fontRef>
+        </p:style>
+      </p:cxnSp>
+      <p:cxnSp>
+        <p:nvCxnSpPr>
+          <p:cNvPr id="28" name="מחבר חץ ישר 27">
+            <a:extLst>
+              <a:ext uri="{FF2B5EF4-FFF2-40B4-BE49-F238E27FC236}">
+                <a16:creationId xmlns:a16="http://schemas.microsoft.com/office/drawing/2014/main" id="{A8FF76D7-A2DD-3532-BB78-7B85A52AADC6}"/>
+              </a:ext>
+            </a:extLst>
+          </p:cNvPr>
+          <p:cNvCxnSpPr>
+            <a:cxnSpLocks/>
+            <a:stCxn id="4" idx="6"/>
+            <a:endCxn id="8" idx="2"/>
+          </p:cNvCxnSpPr>
+          <p:nvPr/>
+        </p:nvCxnSpPr>
+        <p:spPr>
+          <a:xfrm flipV="1">
+            <a:off x="6986016" y="2099310"/>
+            <a:ext cx="737616" cy="1416558"/>
+          </a:xfrm>
+          <a:prstGeom prst="straightConnector1">
+            <a:avLst/>
+          </a:prstGeom>
+          <a:ln>
+            <a:tailEnd type="triangle"/>
+          </a:ln>
+        </p:spPr>
+        <p:style>
+          <a:lnRef idx="2">
+            <a:schemeClr val="accent1"/>
+          </a:lnRef>
+          <a:fillRef idx="0">
+            <a:schemeClr val="accent1"/>
+          </a:fillRef>
+          <a:effectRef idx="1">
+            <a:schemeClr val="accent1"/>
+          </a:effectRef>
+          <a:fontRef idx="minor">
+            <a:schemeClr val="tx1"/>
+          </a:fontRef>
+        </p:style>
+      </p:cxnSp>
+      <p:cxnSp>
+        <p:nvCxnSpPr>
+          <p:cNvPr id="31" name="מחבר חץ ישר 30">
+            <a:extLst>
+              <a:ext uri="{FF2B5EF4-FFF2-40B4-BE49-F238E27FC236}">
+                <a16:creationId xmlns:a16="http://schemas.microsoft.com/office/drawing/2014/main" id="{8C206C99-3726-E16D-6DC7-FC6187B1A5DF}"/>
+              </a:ext>
+            </a:extLst>
+          </p:cNvPr>
+          <p:cNvCxnSpPr>
+            <a:cxnSpLocks/>
+            <a:stCxn id="8" idx="4"/>
+            <a:endCxn id="4" idx="6"/>
+          </p:cNvCxnSpPr>
+          <p:nvPr/>
+        </p:nvCxnSpPr>
+        <p:spPr>
+          <a:xfrm flipH="1">
+            <a:off x="6986016" y="2442210"/>
+            <a:ext cx="1830324" cy="1073658"/>
+          </a:xfrm>
+          <a:prstGeom prst="straightConnector1">
+            <a:avLst/>
+          </a:prstGeom>
+          <a:ln>
+            <a:tailEnd type="triangle"/>
+          </a:ln>
+        </p:spPr>
+        <p:style>
+          <a:lnRef idx="2">
+            <a:schemeClr val="accent6"/>
+          </a:lnRef>
+          <a:fillRef idx="0">
+            <a:schemeClr val="accent6"/>
+          </a:fillRef>
+          <a:effectRef idx="1">
+            <a:schemeClr val="accent6"/>
+          </a:effectRef>
+          <a:fontRef idx="minor">
+            <a:schemeClr val="tx1"/>
+          </a:fontRef>
+        </p:style>
+      </p:cxnSp>
+    </p:spTree>
+    <p:extLst>
+      <p:ext uri="{BB962C8B-B14F-4D97-AF65-F5344CB8AC3E}">
+        <p14:creationId xmlns:p14="http://schemas.microsoft.com/office/powerpoint/2010/main" val="546072099"/>
+      </p:ext>
+    </p:extLst>
+  </p:cSld>
+  <p:clrMapOvr>
+    <a:masterClrMapping/>
+  </p:clrMapOvr>
+</p:sld>
+</file>
+
+<file path=ppt/slides/slide3.xml><?xml version="1.0" encoding="utf-8"?>
+<p:sld xmlns:a="http://schemas.openxmlformats.org/drawingml/2006/main" xmlns:r="http://schemas.openxmlformats.org/officeDocument/2006/relationships" xmlns:p="http://schemas.openxmlformats.org/presentationml/2006/main">
+  <p:cSld>
+    <p:spTree>
+      <p:nvGrpSpPr>
+        <p:cNvPr id="1" name=""/>
+        <p:cNvGrpSpPr/>
+        <p:nvPr/>
+      </p:nvGrpSpPr>
+      <p:grpSpPr>
+        <a:xfrm>
+          <a:off x="0" y="0"/>
+          <a:ext cx="0" cy="0"/>
+          <a:chOff x="0" y="0"/>
+          <a:chExt cx="0" cy="0"/>
+        </a:xfrm>
+      </p:grpSpPr>
+    </p:spTree>
+    <p:extLst>
+      <p:ext uri="{BB962C8B-B14F-4D97-AF65-F5344CB8AC3E}">
+        <p14:creationId xmlns:p14="http://schemas.microsoft.com/office/powerpoint/2010/main" val="3331921883"/>
       </p:ext>
     </p:extLst>
   </p:cSld>

</xml_diff>